<commit_message>
Moving hopefully correct file and renaming strange file
</commit_message>
<xml_diff>
--- a/Readings/Embracing Change with Extreme Programming - MJS.pptx
+++ b/Readings/Embracing Change with Extreme Programming - MJS.pptx
@@ -1,21 +1,21 @@
 
 <file path=ppt/presentation.xml><?xml version="1.0" encoding="utf-8"?>
-<p:presentation xmlns:a="http://schemas.openxmlformats.org/drawingml/2006/main" xmlns:r="http://schemas.openxmlformats.org/officeDocument/2006/relationships" xmlns:p="http://schemas.openxmlformats.org/presentationml/2006/main" saveSubsetFonts="1">
+<p:presentation xmlns:a="http://schemas.openxmlformats.org/drawingml/2006/main" xmlns:r="http://schemas.openxmlformats.org/officeDocument/2006/relationships" xmlns:p="http://schemas.openxmlformats.org/presentationml/2006/main" serverZoom="21443" saveSubsetFonts="1">
   <p:sldMasterIdLst>
     <p:sldMasterId id="2147483660" r:id="rId1"/>
   </p:sldMasterIdLst>
   <p:notesMasterIdLst>
-    <p:notesMasterId r:id="rId22"/>
+    <p:notesMasterId r:id="rId19"/>
   </p:notesMasterIdLst>
   <p:sldIdLst>
     <p:sldId id="256" r:id="rId2"/>
     <p:sldId id="265" r:id="rId3"/>
-    <p:sldId id="274" r:id="rId4"/>
-    <p:sldId id="264" r:id="rId5"/>
-    <p:sldId id="257" r:id="rId6"/>
-    <p:sldId id="266" r:id="rId7"/>
-    <p:sldId id="267" r:id="rId8"/>
-    <p:sldId id="258" r:id="rId9"/>
+    <p:sldId id="264" r:id="rId4"/>
+    <p:sldId id="257" r:id="rId5"/>
+    <p:sldId id="266" r:id="rId6"/>
+    <p:sldId id="267" r:id="rId7"/>
+    <p:sldId id="258" r:id="rId8"/>
+    <p:sldId id="275" r:id="rId9"/>
     <p:sldId id="259" r:id="rId10"/>
     <p:sldId id="260" r:id="rId11"/>
     <p:sldId id="261" r:id="rId12"/>
@@ -24,13 +24,10 @@
     <p:sldId id="272" r:id="rId15"/>
     <p:sldId id="269" r:id="rId16"/>
     <p:sldId id="270" r:id="rId17"/>
-    <p:sldId id="271" r:id="rId18"/>
-    <p:sldId id="273" r:id="rId19"/>
-    <p:sldId id="268" r:id="rId20"/>
-    <p:sldId id="275" r:id="rId21"/>
+    <p:sldId id="268" r:id="rId18"/>
   </p:sldIdLst>
   <p:sldSz cx="9144000" cy="6858000" type="screen4x3"/>
-  <p:notesSz cx="6858000" cy="9144000"/>
+  <p:notesSz cx="6858000" cy="9296400"/>
   <p:defaultTextStyle>
     <a:defPPr>
       <a:defRPr lang="en-US"/>
@@ -126,6 +123,36 @@
       </a:defRPr>
     </a:lvl9pPr>
   </p:defaultTextStyle>
+  <p:extLst>
+    <p:ext uri="{EFAFB233-063F-42B5-8137-9DF3F51BA10A}">
+      <p15:sldGuideLst xmlns:p15="http://schemas.microsoft.com/office/powerpoint/2012/main">
+        <p15:guide id="1" orient="horz" pos="2160">
+          <p15:clr>
+            <a:srgbClr val="A4A3A4"/>
+          </p15:clr>
+        </p15:guide>
+        <p15:guide id="2" pos="2880">
+          <p15:clr>
+            <a:srgbClr val="A4A3A4"/>
+          </p15:clr>
+        </p15:guide>
+      </p15:sldGuideLst>
+    </p:ext>
+    <p:ext uri="{2D200454-40CA-4A62-9FC3-DE9A4176ACB9}">
+      <p15:notesGuideLst xmlns:p15="http://schemas.microsoft.com/office/powerpoint/2012/main">
+        <p15:guide id="1" orient="horz" pos="2928" userDrawn="1">
+          <p15:clr>
+            <a:srgbClr val="A4A3A4"/>
+          </p15:clr>
+        </p15:guide>
+        <p15:guide id="2" pos="2160" userDrawn="1">
+          <p15:clr>
+            <a:srgbClr val="A4A3A4"/>
+          </p15:clr>
+        </p15:guide>
+      </p15:notesGuideLst>
+    </p:ext>
+  </p:extLst>
 </p:presentation>
 </file>
 
@@ -164,7 +191,7 @@
         <p:spPr>
           <a:xfrm>
             <a:off x="0" y="0"/>
-            <a:ext cx="2971800" cy="457200"/>
+            <a:ext cx="2971800" cy="464820"/>
           </a:xfrm>
           <a:prstGeom prst="rect">
             <a:avLst/>
@@ -178,7 +205,7 @@
             </a:lvl1pPr>
           </a:lstStyle>
           <a:p>
-            <a:endParaRPr lang="en-US"/>
+            <a:endParaRPr lang="en-US" dirty="0"/>
           </a:p>
         </p:txBody>
       </p:sp>
@@ -195,7 +222,7 @@
         <p:spPr>
           <a:xfrm>
             <a:off x="3884613" y="0"/>
-            <a:ext cx="2971800" cy="457200"/>
+            <a:ext cx="2971800" cy="464820"/>
           </a:xfrm>
           <a:prstGeom prst="rect">
             <a:avLst/>
@@ -211,9 +238,9 @@
           <a:p>
             <a:fld id="{F12BB996-842F-48F0-B96F-B493008C61E1}" type="datetimeFigureOut">
               <a:rPr lang="en-US" smtClean="0"/>
-              <a:t>01-Mar-2016</a:t>
+              <a:t>01-Mar-16</a:t>
             </a:fld>
-            <a:endParaRPr lang="en-US"/>
+            <a:endParaRPr lang="en-US" dirty="0"/>
           </a:p>
         </p:txBody>
       </p:sp>
@@ -229,8 +256,8 @@
         </p:nvSpPr>
         <p:spPr>
           <a:xfrm>
-            <a:off x="1143000" y="685800"/>
-            <a:ext cx="4572000" cy="3429000"/>
+            <a:off x="1104900" y="696913"/>
+            <a:ext cx="4648200" cy="3486150"/>
           </a:xfrm>
           <a:prstGeom prst="rect">
             <a:avLst/>
@@ -246,7 +273,7 @@
           <a:bodyPr vert="horz" lIns="91440" tIns="45720" rIns="91440" bIns="45720" rtlCol="0" anchor="ctr"/>
           <a:lstStyle/>
           <a:p>
-            <a:endParaRPr lang="en-US"/>
+            <a:endParaRPr lang="en-US" dirty="0"/>
           </a:p>
         </p:txBody>
       </p:sp>
@@ -262,8 +289,8 @@
         </p:nvSpPr>
         <p:spPr>
           <a:xfrm>
-            <a:off x="685800" y="4343400"/>
-            <a:ext cx="5486400" cy="4114800"/>
+            <a:off x="685800" y="4415790"/>
+            <a:ext cx="5486400" cy="4183380"/>
           </a:xfrm>
           <a:prstGeom prst="rect">
             <a:avLst/>
@@ -322,8 +349,8 @@
         </p:nvSpPr>
         <p:spPr>
           <a:xfrm>
-            <a:off x="0" y="8685213"/>
-            <a:ext cx="2971800" cy="457200"/>
+            <a:off x="0" y="8829967"/>
+            <a:ext cx="2971800" cy="464820"/>
           </a:xfrm>
           <a:prstGeom prst="rect">
             <a:avLst/>
@@ -337,7 +364,7 @@
             </a:lvl1pPr>
           </a:lstStyle>
           <a:p>
-            <a:endParaRPr lang="en-US"/>
+            <a:endParaRPr lang="en-US" dirty="0"/>
           </a:p>
         </p:txBody>
       </p:sp>
@@ -353,8 +380,8 @@
         </p:nvSpPr>
         <p:spPr>
           <a:xfrm>
-            <a:off x="3884613" y="8685213"/>
-            <a:ext cx="2971800" cy="457200"/>
+            <a:off x="3884613" y="8829967"/>
+            <a:ext cx="2971800" cy="464820"/>
           </a:xfrm>
           <a:prstGeom prst="rect">
             <a:avLst/>
@@ -372,7 +399,7 @@
               <a:rPr lang="en-US" smtClean="0"/>
               <a:t>‹#›</a:t>
             </a:fld>
-            <a:endParaRPr lang="en-US"/>
+            <a:endParaRPr lang="en-US" dirty="0"/>
           </a:p>
         </p:txBody>
       </p:sp>
@@ -560,7 +587,7 @@
               <a:rPr lang="en-US" smtClean="0"/>
               <a:t>1</a:t>
             </a:fld>
-            <a:endParaRPr lang="en-US"/>
+            <a:endParaRPr lang="en-US" dirty="0"/>
           </a:p>
         </p:txBody>
       </p:sp>
@@ -568,6 +595,721 @@
     <p:extLst>
       <p:ext uri="{BB962C8B-B14F-4D97-AF65-F5344CB8AC3E}">
         <p14:creationId xmlns:p14="http://schemas.microsoft.com/office/powerpoint/2010/main" val="3422594060"/>
+      </p:ext>
+    </p:extLst>
+  </p:cSld>
+  <p:clrMapOvr>
+    <a:masterClrMapping/>
+  </p:clrMapOvr>
+</p:notes>
+</file>
+
+<file path=ppt/notesSlides/notesSlide10.xml><?xml version="1.0" encoding="utf-8"?>
+<p:notes xmlns:a="http://schemas.openxmlformats.org/drawingml/2006/main" xmlns:r="http://schemas.openxmlformats.org/officeDocument/2006/relationships" xmlns:p="http://schemas.openxmlformats.org/presentationml/2006/main">
+  <p:cSld>
+    <p:spTree>
+      <p:nvGrpSpPr>
+        <p:cNvPr id="1" name=""/>
+        <p:cNvGrpSpPr/>
+        <p:nvPr/>
+      </p:nvGrpSpPr>
+      <p:grpSpPr>
+        <a:xfrm>
+          <a:off x="0" y="0"/>
+          <a:ext cx="0" cy="0"/>
+          <a:chOff x="0" y="0"/>
+          <a:chExt cx="0" cy="0"/>
+        </a:xfrm>
+      </p:grpSpPr>
+      <p:sp>
+        <p:nvSpPr>
+          <p:cNvPr id="2" name="Slide Image Placeholder 1"/>
+          <p:cNvSpPr>
+            <a:spLocks noGrp="1" noRot="1" noChangeAspect="1"/>
+          </p:cNvSpPr>
+          <p:nvPr>
+            <p:ph type="sldImg"/>
+          </p:nvPr>
+        </p:nvSpPr>
+        <p:spPr/>
+      </p:sp>
+      <p:sp>
+        <p:nvSpPr>
+          <p:cNvPr id="3" name="Notes Placeholder 2"/>
+          <p:cNvSpPr>
+            <a:spLocks noGrp="1"/>
+          </p:cNvSpPr>
+          <p:nvPr>
+            <p:ph type="body" idx="1"/>
+          </p:nvPr>
+        </p:nvSpPr>
+        <p:spPr/>
+        <p:txBody>
+          <a:bodyPr/>
+          <a:lstStyle/>
+          <a:p>
+            <a:endParaRPr lang="en-US"/>
+          </a:p>
+        </p:txBody>
+      </p:sp>
+      <p:sp>
+        <p:nvSpPr>
+          <p:cNvPr id="4" name="Slide Number Placeholder 3"/>
+          <p:cNvSpPr>
+            <a:spLocks noGrp="1"/>
+          </p:cNvSpPr>
+          <p:nvPr>
+            <p:ph type="sldNum" sz="quarter" idx="10"/>
+          </p:nvPr>
+        </p:nvSpPr>
+        <p:spPr/>
+        <p:txBody>
+          <a:bodyPr/>
+          <a:lstStyle/>
+          <a:p>
+            <a:fld id="{7892A9F2-C641-4649-AAAB-23CA8069F891}" type="slidenum">
+              <a:rPr lang="en-US" smtClean="0"/>
+              <a:t>10</a:t>
+            </a:fld>
+            <a:endParaRPr lang="en-US" dirty="0"/>
+          </a:p>
+        </p:txBody>
+      </p:sp>
+    </p:spTree>
+    <p:extLst>
+      <p:ext uri="{BB962C8B-B14F-4D97-AF65-F5344CB8AC3E}">
+        <p14:creationId xmlns:p14="http://schemas.microsoft.com/office/powerpoint/2010/main" val="1207060920"/>
+      </p:ext>
+    </p:extLst>
+  </p:cSld>
+  <p:clrMapOvr>
+    <a:masterClrMapping/>
+  </p:clrMapOvr>
+</p:notes>
+</file>
+
+<file path=ppt/notesSlides/notesSlide11.xml><?xml version="1.0" encoding="utf-8"?>
+<p:notes xmlns:a="http://schemas.openxmlformats.org/drawingml/2006/main" xmlns:r="http://schemas.openxmlformats.org/officeDocument/2006/relationships" xmlns:p="http://schemas.openxmlformats.org/presentationml/2006/main">
+  <p:cSld>
+    <p:spTree>
+      <p:nvGrpSpPr>
+        <p:cNvPr id="1" name=""/>
+        <p:cNvGrpSpPr/>
+        <p:nvPr/>
+      </p:nvGrpSpPr>
+      <p:grpSpPr>
+        <a:xfrm>
+          <a:off x="0" y="0"/>
+          <a:ext cx="0" cy="0"/>
+          <a:chOff x="0" y="0"/>
+          <a:chExt cx="0" cy="0"/>
+        </a:xfrm>
+      </p:grpSpPr>
+      <p:sp>
+        <p:nvSpPr>
+          <p:cNvPr id="2" name="Slide Image Placeholder 1"/>
+          <p:cNvSpPr>
+            <a:spLocks noGrp="1" noRot="1" noChangeAspect="1"/>
+          </p:cNvSpPr>
+          <p:nvPr>
+            <p:ph type="sldImg"/>
+          </p:nvPr>
+        </p:nvSpPr>
+        <p:spPr/>
+      </p:sp>
+      <p:sp>
+        <p:nvSpPr>
+          <p:cNvPr id="3" name="Notes Placeholder 2"/>
+          <p:cNvSpPr>
+            <a:spLocks noGrp="1"/>
+          </p:cNvSpPr>
+          <p:nvPr>
+            <p:ph type="body" idx="1"/>
+          </p:nvPr>
+        </p:nvSpPr>
+        <p:spPr/>
+        <p:txBody>
+          <a:bodyPr/>
+          <a:lstStyle/>
+          <a:p>
+            <a:pPr marL="0" marR="0" indent="0" algn="l" defTabSz="914400" rtl="0" eaLnBrk="1" fontAlgn="auto" latinLnBrk="0" hangingPunct="1">
+              <a:lnSpc>
+                <a:spcPct val="100000"/>
+              </a:lnSpc>
+              <a:spcBef>
+                <a:spcPts val="0"/>
+              </a:spcBef>
+              <a:spcAft>
+                <a:spcPts val="0"/>
+              </a:spcAft>
+              <a:buClrTx/>
+              <a:buSzTx/>
+              <a:buFontTx/>
+              <a:buNone/>
+              <a:tabLst/>
+              <a:defRPr/>
+            </a:pPr>
+            <a:r>
+              <a:rPr lang="en-US" dirty="0" smtClean="0"/>
+              <a:t>Goal of each iteration is to put new tested stories into production</a:t>
+            </a:r>
+          </a:p>
+        </p:txBody>
+      </p:sp>
+      <p:sp>
+        <p:nvSpPr>
+          <p:cNvPr id="4" name="Slide Number Placeholder 3"/>
+          <p:cNvSpPr>
+            <a:spLocks noGrp="1"/>
+          </p:cNvSpPr>
+          <p:nvPr>
+            <p:ph type="sldNum" sz="quarter" idx="10"/>
+          </p:nvPr>
+        </p:nvSpPr>
+        <p:spPr/>
+        <p:txBody>
+          <a:bodyPr/>
+          <a:lstStyle/>
+          <a:p>
+            <a:fld id="{7892A9F2-C641-4649-AAAB-23CA8069F891}" type="slidenum">
+              <a:rPr lang="en-US" smtClean="0"/>
+              <a:t>11</a:t>
+            </a:fld>
+            <a:endParaRPr lang="en-US" dirty="0"/>
+          </a:p>
+        </p:txBody>
+      </p:sp>
+    </p:spTree>
+    <p:extLst>
+      <p:ext uri="{BB962C8B-B14F-4D97-AF65-F5344CB8AC3E}">
+        <p14:creationId xmlns:p14="http://schemas.microsoft.com/office/powerpoint/2010/main" val="2356328425"/>
+      </p:ext>
+    </p:extLst>
+  </p:cSld>
+  <p:clrMapOvr>
+    <a:masterClrMapping/>
+  </p:clrMapOvr>
+</p:notes>
+</file>
+
+<file path=ppt/notesSlides/notesSlide12.xml><?xml version="1.0" encoding="utf-8"?>
+<p:notes xmlns:a="http://schemas.openxmlformats.org/drawingml/2006/main" xmlns:r="http://schemas.openxmlformats.org/officeDocument/2006/relationships" xmlns:p="http://schemas.openxmlformats.org/presentationml/2006/main">
+  <p:cSld>
+    <p:spTree>
+      <p:nvGrpSpPr>
+        <p:cNvPr id="1" name=""/>
+        <p:cNvGrpSpPr/>
+        <p:nvPr/>
+      </p:nvGrpSpPr>
+      <p:grpSpPr>
+        <a:xfrm>
+          <a:off x="0" y="0"/>
+          <a:ext cx="0" cy="0"/>
+          <a:chOff x="0" y="0"/>
+          <a:chExt cx="0" cy="0"/>
+        </a:xfrm>
+      </p:grpSpPr>
+      <p:sp>
+        <p:nvSpPr>
+          <p:cNvPr id="2" name="Slide Image Placeholder 1"/>
+          <p:cNvSpPr>
+            <a:spLocks noGrp="1" noRot="1" noChangeAspect="1"/>
+          </p:cNvSpPr>
+          <p:nvPr>
+            <p:ph type="sldImg"/>
+          </p:nvPr>
+        </p:nvSpPr>
+        <p:spPr/>
+      </p:sp>
+      <p:sp>
+        <p:nvSpPr>
+          <p:cNvPr id="3" name="Notes Placeholder 2"/>
+          <p:cNvSpPr>
+            <a:spLocks noGrp="1"/>
+          </p:cNvSpPr>
+          <p:nvPr>
+            <p:ph type="body" idx="1"/>
+          </p:nvPr>
+        </p:nvSpPr>
+        <p:spPr/>
+        <p:txBody>
+          <a:bodyPr/>
+          <a:lstStyle/>
+          <a:p>
+            <a:endParaRPr lang="en-US"/>
+          </a:p>
+        </p:txBody>
+      </p:sp>
+      <p:sp>
+        <p:nvSpPr>
+          <p:cNvPr id="4" name="Slide Number Placeholder 3"/>
+          <p:cNvSpPr>
+            <a:spLocks noGrp="1"/>
+          </p:cNvSpPr>
+          <p:nvPr>
+            <p:ph type="sldNum" sz="quarter" idx="10"/>
+          </p:nvPr>
+        </p:nvSpPr>
+        <p:spPr/>
+        <p:txBody>
+          <a:bodyPr/>
+          <a:lstStyle/>
+          <a:p>
+            <a:fld id="{7892A9F2-C641-4649-AAAB-23CA8069F891}" type="slidenum">
+              <a:rPr lang="en-US" smtClean="0"/>
+              <a:t>12</a:t>
+            </a:fld>
+            <a:endParaRPr lang="en-US" dirty="0"/>
+          </a:p>
+        </p:txBody>
+      </p:sp>
+    </p:spTree>
+    <p:extLst>
+      <p:ext uri="{BB962C8B-B14F-4D97-AF65-F5344CB8AC3E}">
+        <p14:creationId xmlns:p14="http://schemas.microsoft.com/office/powerpoint/2010/main" val="588288631"/>
+      </p:ext>
+    </p:extLst>
+  </p:cSld>
+  <p:clrMapOvr>
+    <a:masterClrMapping/>
+  </p:clrMapOvr>
+</p:notes>
+</file>
+
+<file path=ppt/notesSlides/notesSlide13.xml><?xml version="1.0" encoding="utf-8"?>
+<p:notes xmlns:a="http://schemas.openxmlformats.org/drawingml/2006/main" xmlns:r="http://schemas.openxmlformats.org/officeDocument/2006/relationships" xmlns:p="http://schemas.openxmlformats.org/presentationml/2006/main">
+  <p:cSld>
+    <p:spTree>
+      <p:nvGrpSpPr>
+        <p:cNvPr id="1" name=""/>
+        <p:cNvGrpSpPr/>
+        <p:nvPr/>
+      </p:nvGrpSpPr>
+      <p:grpSpPr>
+        <a:xfrm>
+          <a:off x="0" y="0"/>
+          <a:ext cx="0" cy="0"/>
+          <a:chOff x="0" y="0"/>
+          <a:chExt cx="0" cy="0"/>
+        </a:xfrm>
+      </p:grpSpPr>
+      <p:sp>
+        <p:nvSpPr>
+          <p:cNvPr id="2" name="Slide Image Placeholder 1"/>
+          <p:cNvSpPr>
+            <a:spLocks noGrp="1" noRot="1" noChangeAspect="1"/>
+          </p:cNvSpPr>
+          <p:nvPr>
+            <p:ph type="sldImg"/>
+          </p:nvPr>
+        </p:nvSpPr>
+        <p:spPr/>
+      </p:sp>
+      <p:sp>
+        <p:nvSpPr>
+          <p:cNvPr id="3" name="Notes Placeholder 2"/>
+          <p:cNvSpPr>
+            <a:spLocks noGrp="1"/>
+          </p:cNvSpPr>
+          <p:nvPr>
+            <p:ph type="body" idx="1"/>
+          </p:nvPr>
+        </p:nvSpPr>
+        <p:spPr/>
+        <p:txBody>
+          <a:bodyPr/>
+          <a:lstStyle/>
+          <a:p>
+            <a:pPr marL="0" marR="0" indent="0" algn="l" defTabSz="914400" rtl="0" eaLnBrk="1" fontAlgn="auto" latinLnBrk="0" hangingPunct="1">
+              <a:lnSpc>
+                <a:spcPct val="100000"/>
+              </a:lnSpc>
+              <a:spcBef>
+                <a:spcPts val="0"/>
+              </a:spcBef>
+              <a:spcAft>
+                <a:spcPts val="0"/>
+              </a:spcAft>
+              <a:buClrTx/>
+              <a:buSzTx/>
+              <a:buFontTx/>
+              <a:buNone/>
+              <a:tabLst/>
+              <a:defRPr/>
+            </a:pPr>
+            <a:r>
+              <a:rPr lang="en-US" dirty="0" smtClean="0"/>
+              <a:t>Unit testing is a key component of XP</a:t>
+            </a:r>
+          </a:p>
+          <a:p>
+            <a:endParaRPr lang="en-US" dirty="0"/>
+          </a:p>
+        </p:txBody>
+      </p:sp>
+      <p:sp>
+        <p:nvSpPr>
+          <p:cNvPr id="4" name="Slide Number Placeholder 3"/>
+          <p:cNvSpPr>
+            <a:spLocks noGrp="1"/>
+          </p:cNvSpPr>
+          <p:nvPr>
+            <p:ph type="sldNum" sz="quarter" idx="10"/>
+          </p:nvPr>
+        </p:nvSpPr>
+        <p:spPr/>
+        <p:txBody>
+          <a:bodyPr/>
+          <a:lstStyle/>
+          <a:p>
+            <a:fld id="{7892A9F2-C641-4649-AAAB-23CA8069F891}" type="slidenum">
+              <a:rPr lang="en-US" smtClean="0"/>
+              <a:t>13</a:t>
+            </a:fld>
+            <a:endParaRPr lang="en-US" dirty="0"/>
+          </a:p>
+        </p:txBody>
+      </p:sp>
+    </p:spTree>
+    <p:extLst>
+      <p:ext uri="{BB962C8B-B14F-4D97-AF65-F5344CB8AC3E}">
+        <p14:creationId xmlns:p14="http://schemas.microsoft.com/office/powerpoint/2010/main" val="2733037194"/>
+      </p:ext>
+    </p:extLst>
+  </p:cSld>
+  <p:clrMapOvr>
+    <a:masterClrMapping/>
+  </p:clrMapOvr>
+</p:notes>
+</file>
+
+<file path=ppt/notesSlides/notesSlide14.xml><?xml version="1.0" encoding="utf-8"?>
+<p:notes xmlns:a="http://schemas.openxmlformats.org/drawingml/2006/main" xmlns:r="http://schemas.openxmlformats.org/officeDocument/2006/relationships" xmlns:p="http://schemas.openxmlformats.org/presentationml/2006/main">
+  <p:cSld>
+    <p:spTree>
+      <p:nvGrpSpPr>
+        <p:cNvPr id="1" name=""/>
+        <p:cNvGrpSpPr/>
+        <p:nvPr/>
+      </p:nvGrpSpPr>
+      <p:grpSpPr>
+        <a:xfrm>
+          <a:off x="0" y="0"/>
+          <a:ext cx="0" cy="0"/>
+          <a:chOff x="0" y="0"/>
+          <a:chExt cx="0" cy="0"/>
+        </a:xfrm>
+      </p:grpSpPr>
+      <p:sp>
+        <p:nvSpPr>
+          <p:cNvPr id="2" name="Slide Image Placeholder 1"/>
+          <p:cNvSpPr>
+            <a:spLocks noGrp="1" noRot="1" noChangeAspect="1"/>
+          </p:cNvSpPr>
+          <p:nvPr>
+            <p:ph type="sldImg"/>
+          </p:nvPr>
+        </p:nvSpPr>
+        <p:spPr/>
+      </p:sp>
+      <p:sp>
+        <p:nvSpPr>
+          <p:cNvPr id="3" name="Notes Placeholder 2"/>
+          <p:cNvSpPr>
+            <a:spLocks noGrp="1"/>
+          </p:cNvSpPr>
+          <p:nvPr>
+            <p:ph type="body" idx="1"/>
+          </p:nvPr>
+        </p:nvSpPr>
+        <p:spPr/>
+        <p:txBody>
+          <a:bodyPr/>
+          <a:lstStyle/>
+          <a:p>
+            <a:endParaRPr lang="en-US"/>
+          </a:p>
+        </p:txBody>
+      </p:sp>
+      <p:sp>
+        <p:nvSpPr>
+          <p:cNvPr id="4" name="Slide Number Placeholder 3"/>
+          <p:cNvSpPr>
+            <a:spLocks noGrp="1"/>
+          </p:cNvSpPr>
+          <p:nvPr>
+            <p:ph type="sldNum" sz="quarter" idx="10"/>
+          </p:nvPr>
+        </p:nvSpPr>
+        <p:spPr/>
+        <p:txBody>
+          <a:bodyPr/>
+          <a:lstStyle/>
+          <a:p>
+            <a:fld id="{7892A9F2-C641-4649-AAAB-23CA8069F891}" type="slidenum">
+              <a:rPr lang="en-US" smtClean="0"/>
+              <a:t>14</a:t>
+            </a:fld>
+            <a:endParaRPr lang="en-US" dirty="0"/>
+          </a:p>
+        </p:txBody>
+      </p:sp>
+    </p:spTree>
+    <p:extLst>
+      <p:ext uri="{BB962C8B-B14F-4D97-AF65-F5344CB8AC3E}">
+        <p14:creationId xmlns:p14="http://schemas.microsoft.com/office/powerpoint/2010/main" val="1218285216"/>
+      </p:ext>
+    </p:extLst>
+  </p:cSld>
+  <p:clrMapOvr>
+    <a:masterClrMapping/>
+  </p:clrMapOvr>
+</p:notes>
+</file>
+
+<file path=ppt/notesSlides/notesSlide15.xml><?xml version="1.0" encoding="utf-8"?>
+<p:notes xmlns:a="http://schemas.openxmlformats.org/drawingml/2006/main" xmlns:r="http://schemas.openxmlformats.org/officeDocument/2006/relationships" xmlns:p="http://schemas.openxmlformats.org/presentationml/2006/main">
+  <p:cSld>
+    <p:spTree>
+      <p:nvGrpSpPr>
+        <p:cNvPr id="1" name=""/>
+        <p:cNvGrpSpPr/>
+        <p:nvPr/>
+      </p:nvGrpSpPr>
+      <p:grpSpPr>
+        <a:xfrm>
+          <a:off x="0" y="0"/>
+          <a:ext cx="0" cy="0"/>
+          <a:chOff x="0" y="0"/>
+          <a:chExt cx="0" cy="0"/>
+        </a:xfrm>
+      </p:grpSpPr>
+      <p:sp>
+        <p:nvSpPr>
+          <p:cNvPr id="2" name="Slide Image Placeholder 1"/>
+          <p:cNvSpPr>
+            <a:spLocks noGrp="1" noRot="1" noChangeAspect="1"/>
+          </p:cNvSpPr>
+          <p:nvPr>
+            <p:ph type="sldImg"/>
+          </p:nvPr>
+        </p:nvSpPr>
+        <p:spPr/>
+      </p:sp>
+      <p:sp>
+        <p:nvSpPr>
+          <p:cNvPr id="3" name="Notes Placeholder 2"/>
+          <p:cNvSpPr>
+            <a:spLocks noGrp="1"/>
+          </p:cNvSpPr>
+          <p:nvPr>
+            <p:ph type="body" idx="1"/>
+          </p:nvPr>
+        </p:nvSpPr>
+        <p:spPr/>
+        <p:txBody>
+          <a:bodyPr/>
+          <a:lstStyle/>
+          <a:p>
+            <a:endParaRPr lang="en-US"/>
+          </a:p>
+        </p:txBody>
+      </p:sp>
+      <p:sp>
+        <p:nvSpPr>
+          <p:cNvPr id="4" name="Slide Number Placeholder 3"/>
+          <p:cNvSpPr>
+            <a:spLocks noGrp="1"/>
+          </p:cNvSpPr>
+          <p:nvPr>
+            <p:ph type="sldNum" sz="quarter" idx="10"/>
+          </p:nvPr>
+        </p:nvSpPr>
+        <p:spPr/>
+        <p:txBody>
+          <a:bodyPr/>
+          <a:lstStyle/>
+          <a:p>
+            <a:fld id="{7892A9F2-C641-4649-AAAB-23CA8069F891}" type="slidenum">
+              <a:rPr lang="en-US" smtClean="0"/>
+              <a:t>15</a:t>
+            </a:fld>
+            <a:endParaRPr lang="en-US" dirty="0"/>
+          </a:p>
+        </p:txBody>
+      </p:sp>
+    </p:spTree>
+    <p:extLst>
+      <p:ext uri="{BB962C8B-B14F-4D97-AF65-F5344CB8AC3E}">
+        <p14:creationId xmlns:p14="http://schemas.microsoft.com/office/powerpoint/2010/main" val="1393048563"/>
+      </p:ext>
+    </p:extLst>
+  </p:cSld>
+  <p:clrMapOvr>
+    <a:masterClrMapping/>
+  </p:clrMapOvr>
+</p:notes>
+</file>
+
+<file path=ppt/notesSlides/notesSlide16.xml><?xml version="1.0" encoding="utf-8"?>
+<p:notes xmlns:a="http://schemas.openxmlformats.org/drawingml/2006/main" xmlns:r="http://schemas.openxmlformats.org/officeDocument/2006/relationships" xmlns:p="http://schemas.openxmlformats.org/presentationml/2006/main">
+  <p:cSld>
+    <p:spTree>
+      <p:nvGrpSpPr>
+        <p:cNvPr id="1" name=""/>
+        <p:cNvGrpSpPr/>
+        <p:nvPr/>
+      </p:nvGrpSpPr>
+      <p:grpSpPr>
+        <a:xfrm>
+          <a:off x="0" y="0"/>
+          <a:ext cx="0" cy="0"/>
+          <a:chOff x="0" y="0"/>
+          <a:chExt cx="0" cy="0"/>
+        </a:xfrm>
+      </p:grpSpPr>
+      <p:sp>
+        <p:nvSpPr>
+          <p:cNvPr id="2" name="Slide Image Placeholder 1"/>
+          <p:cNvSpPr>
+            <a:spLocks noGrp="1" noRot="1" noChangeAspect="1"/>
+          </p:cNvSpPr>
+          <p:nvPr>
+            <p:ph type="sldImg"/>
+          </p:nvPr>
+        </p:nvSpPr>
+        <p:spPr/>
+      </p:sp>
+      <p:sp>
+        <p:nvSpPr>
+          <p:cNvPr id="3" name="Notes Placeholder 2"/>
+          <p:cNvSpPr>
+            <a:spLocks noGrp="1"/>
+          </p:cNvSpPr>
+          <p:nvPr>
+            <p:ph type="body" idx="1"/>
+          </p:nvPr>
+        </p:nvSpPr>
+        <p:spPr/>
+        <p:txBody>
+          <a:bodyPr/>
+          <a:lstStyle/>
+          <a:p>
+            <a:endParaRPr lang="en-US"/>
+          </a:p>
+        </p:txBody>
+      </p:sp>
+      <p:sp>
+        <p:nvSpPr>
+          <p:cNvPr id="4" name="Slide Number Placeholder 3"/>
+          <p:cNvSpPr>
+            <a:spLocks noGrp="1"/>
+          </p:cNvSpPr>
+          <p:nvPr>
+            <p:ph type="sldNum" sz="quarter" idx="10"/>
+          </p:nvPr>
+        </p:nvSpPr>
+        <p:spPr/>
+        <p:txBody>
+          <a:bodyPr/>
+          <a:lstStyle/>
+          <a:p>
+            <a:fld id="{7892A9F2-C641-4649-AAAB-23CA8069F891}" type="slidenum">
+              <a:rPr lang="en-US" smtClean="0"/>
+              <a:t>16</a:t>
+            </a:fld>
+            <a:endParaRPr lang="en-US" dirty="0"/>
+          </a:p>
+        </p:txBody>
+      </p:sp>
+    </p:spTree>
+    <p:extLst>
+      <p:ext uri="{BB962C8B-B14F-4D97-AF65-F5344CB8AC3E}">
+        <p14:creationId xmlns:p14="http://schemas.microsoft.com/office/powerpoint/2010/main" val="315601857"/>
+      </p:ext>
+    </p:extLst>
+  </p:cSld>
+  <p:clrMapOvr>
+    <a:masterClrMapping/>
+  </p:clrMapOvr>
+</p:notes>
+</file>
+
+<file path=ppt/notesSlides/notesSlide17.xml><?xml version="1.0" encoding="utf-8"?>
+<p:notes xmlns:a="http://schemas.openxmlformats.org/drawingml/2006/main" xmlns:r="http://schemas.openxmlformats.org/officeDocument/2006/relationships" xmlns:p="http://schemas.openxmlformats.org/presentationml/2006/main">
+  <p:cSld>
+    <p:spTree>
+      <p:nvGrpSpPr>
+        <p:cNvPr id="1" name=""/>
+        <p:cNvGrpSpPr/>
+        <p:nvPr/>
+      </p:nvGrpSpPr>
+      <p:grpSpPr>
+        <a:xfrm>
+          <a:off x="0" y="0"/>
+          <a:ext cx="0" cy="0"/>
+          <a:chOff x="0" y="0"/>
+          <a:chExt cx="0" cy="0"/>
+        </a:xfrm>
+      </p:grpSpPr>
+      <p:sp>
+        <p:nvSpPr>
+          <p:cNvPr id="2" name="Slide Image Placeholder 1"/>
+          <p:cNvSpPr>
+            <a:spLocks noGrp="1" noRot="1" noChangeAspect="1"/>
+          </p:cNvSpPr>
+          <p:nvPr>
+            <p:ph type="sldImg"/>
+          </p:nvPr>
+        </p:nvSpPr>
+        <p:spPr/>
+      </p:sp>
+      <p:sp>
+        <p:nvSpPr>
+          <p:cNvPr id="3" name="Notes Placeholder 2"/>
+          <p:cNvSpPr>
+            <a:spLocks noGrp="1"/>
+          </p:cNvSpPr>
+          <p:nvPr>
+            <p:ph type="body" idx="1"/>
+          </p:nvPr>
+        </p:nvSpPr>
+        <p:spPr/>
+        <p:txBody>
+          <a:bodyPr/>
+          <a:lstStyle/>
+          <a:p>
+            <a:endParaRPr lang="en-US"/>
+          </a:p>
+        </p:txBody>
+      </p:sp>
+      <p:sp>
+        <p:nvSpPr>
+          <p:cNvPr id="4" name="Slide Number Placeholder 3"/>
+          <p:cNvSpPr>
+            <a:spLocks noGrp="1"/>
+          </p:cNvSpPr>
+          <p:nvPr>
+            <p:ph type="sldNum" sz="quarter" idx="10"/>
+          </p:nvPr>
+        </p:nvSpPr>
+        <p:spPr/>
+        <p:txBody>
+          <a:bodyPr/>
+          <a:lstStyle/>
+          <a:p>
+            <a:fld id="{7892A9F2-C641-4649-AAAB-23CA8069F891}" type="slidenum">
+              <a:rPr lang="en-US" smtClean="0"/>
+              <a:t>17</a:t>
+            </a:fld>
+            <a:endParaRPr lang="en-US" dirty="0"/>
+          </a:p>
+        </p:txBody>
+      </p:sp>
+    </p:spTree>
+    <p:extLst>
+      <p:ext uri="{BB962C8B-B14F-4D97-AF65-F5344CB8AC3E}">
+        <p14:creationId xmlns:p14="http://schemas.microsoft.com/office/powerpoint/2010/main" val="3309240052"/>
       </p:ext>
     </p:extLst>
   </p:cSld>
@@ -621,11 +1363,7 @@
           <a:bodyPr/>
           <a:lstStyle/>
           <a:p>
-            <a:r>
-              <a:rPr lang="en-US" dirty="0" smtClean="0"/>
-              <a:t>Evolution</a:t>
-            </a:r>
-            <a:endParaRPr lang="en-US" dirty="0"/>
+            <a:endParaRPr lang="en-US"/>
           </a:p>
         </p:txBody>
       </p:sp>
@@ -646,16 +1384,16 @@
           <a:p>
             <a:fld id="{7892A9F2-C641-4649-AAAB-23CA8069F891}" type="slidenum">
               <a:rPr lang="en-US" smtClean="0"/>
-              <a:t>4</a:t>
+              <a:t>2</a:t>
             </a:fld>
-            <a:endParaRPr lang="en-US"/>
+            <a:endParaRPr lang="en-US" dirty="0"/>
           </a:p>
         </p:txBody>
       </p:sp>
     </p:spTree>
     <p:extLst>
       <p:ext uri="{BB962C8B-B14F-4D97-AF65-F5344CB8AC3E}">
-        <p14:creationId xmlns:p14="http://schemas.microsoft.com/office/powerpoint/2010/main" val="1915136177"/>
+        <p14:creationId xmlns:p14="http://schemas.microsoft.com/office/powerpoint/2010/main" val="2224060575"/>
       </p:ext>
     </p:extLst>
   </p:cSld>
@@ -709,41 +1447,9 @@
           <a:bodyPr/>
           <a:lstStyle/>
           <a:p>
-            <a:pPr marL="0" marR="0" lvl="1" indent="0" algn="l" defTabSz="914400" rtl="0" eaLnBrk="1" fontAlgn="auto" latinLnBrk="0" hangingPunct="1">
-              <a:lnSpc>
-                <a:spcPct val="100000"/>
-              </a:lnSpc>
-              <a:spcBef>
-                <a:spcPts val="0"/>
-              </a:spcBef>
-              <a:spcAft>
-                <a:spcPts val="0"/>
-              </a:spcAft>
-              <a:buClrTx/>
-              <a:buSzTx/>
-              <a:buFontTx/>
-              <a:buNone/>
-              <a:tabLst/>
-              <a:defRPr/>
-            </a:pPr>
-            <a:r>
-              <a:rPr lang="en-US" dirty="0" smtClean="0"/>
-              <a:t>Tests: *</a:t>
-            </a:r>
-            <a:r>
-              <a:rPr lang="en-US" dirty="0" smtClean="0"/>
-              <a:t>comparison of shipping a known defect versus delay cost may come into play</a:t>
-            </a:r>
-            <a:endParaRPr lang="en-US" dirty="0" smtClean="0"/>
-          </a:p>
-          <a:p>
-            <a:r>
-              <a:rPr lang="en-US" dirty="0" smtClean="0"/>
-              <a:t>CI:</a:t>
-            </a:r>
-            <a:r>
-              <a:rPr lang="en-US" baseline="0" dirty="0" smtClean="0"/>
-              <a:t> if tests do not pass all changes are discarded</a:t>
+            <a:r>
+              <a:rPr lang="en-US" dirty="0" smtClean="0"/>
+              <a:t>Evolution</a:t>
             </a:r>
             <a:endParaRPr lang="en-US" dirty="0"/>
           </a:p>
@@ -766,16 +1472,16 @@
           <a:p>
             <a:fld id="{7892A9F2-C641-4649-AAAB-23CA8069F891}" type="slidenum">
               <a:rPr lang="en-US" smtClean="0"/>
-              <a:t>6</a:t>
+              <a:t>3</a:t>
             </a:fld>
-            <a:endParaRPr lang="en-US"/>
+            <a:endParaRPr lang="en-US" dirty="0"/>
           </a:p>
         </p:txBody>
       </p:sp>
     </p:spTree>
     <p:extLst>
       <p:ext uri="{BB962C8B-B14F-4D97-AF65-F5344CB8AC3E}">
-        <p14:creationId xmlns:p14="http://schemas.microsoft.com/office/powerpoint/2010/main" val="3576461718"/>
+        <p14:creationId xmlns:p14="http://schemas.microsoft.com/office/powerpoint/2010/main" val="1915136177"/>
       </p:ext>
     </p:extLst>
   </p:cSld>
@@ -829,6 +1535,225 @@
           <a:bodyPr/>
           <a:lstStyle/>
           <a:p>
+            <a:pPr marL="0" marR="0" lvl="2" indent="0" algn="l" defTabSz="914400" rtl="0" eaLnBrk="1" fontAlgn="auto" latinLnBrk="0" hangingPunct="1">
+              <a:lnSpc>
+                <a:spcPct val="100000"/>
+              </a:lnSpc>
+              <a:spcBef>
+                <a:spcPts val="0"/>
+              </a:spcBef>
+              <a:spcAft>
+                <a:spcPts val="0"/>
+              </a:spcAft>
+              <a:buClrTx/>
+              <a:buSzTx/>
+              <a:buFontTx/>
+              <a:buNone/>
+              <a:tabLst/>
+              <a:defRPr/>
+            </a:pPr>
+            <a:r>
+              <a:rPr lang="en-US" smtClean="0"/>
+              <a:t>“Say everything once and only once”</a:t>
+            </a:r>
+          </a:p>
+        </p:txBody>
+      </p:sp>
+      <p:sp>
+        <p:nvSpPr>
+          <p:cNvPr id="4" name="Slide Number Placeholder 3"/>
+          <p:cNvSpPr>
+            <a:spLocks noGrp="1"/>
+          </p:cNvSpPr>
+          <p:nvPr>
+            <p:ph type="sldNum" sz="quarter" idx="10"/>
+          </p:nvPr>
+        </p:nvSpPr>
+        <p:spPr/>
+        <p:txBody>
+          <a:bodyPr/>
+          <a:lstStyle/>
+          <a:p>
+            <a:fld id="{7892A9F2-C641-4649-AAAB-23CA8069F891}" type="slidenum">
+              <a:rPr lang="en-US" smtClean="0"/>
+              <a:t>4</a:t>
+            </a:fld>
+            <a:endParaRPr lang="en-US" dirty="0"/>
+          </a:p>
+        </p:txBody>
+      </p:sp>
+    </p:spTree>
+    <p:extLst>
+      <p:ext uri="{BB962C8B-B14F-4D97-AF65-F5344CB8AC3E}">
+        <p14:creationId xmlns:p14="http://schemas.microsoft.com/office/powerpoint/2010/main" val="265387461"/>
+      </p:ext>
+    </p:extLst>
+  </p:cSld>
+  <p:clrMapOvr>
+    <a:masterClrMapping/>
+  </p:clrMapOvr>
+</p:notes>
+</file>
+
+<file path=ppt/notesSlides/notesSlide5.xml><?xml version="1.0" encoding="utf-8"?>
+<p:notes xmlns:a="http://schemas.openxmlformats.org/drawingml/2006/main" xmlns:r="http://schemas.openxmlformats.org/officeDocument/2006/relationships" xmlns:p="http://schemas.openxmlformats.org/presentationml/2006/main">
+  <p:cSld>
+    <p:spTree>
+      <p:nvGrpSpPr>
+        <p:cNvPr id="1" name=""/>
+        <p:cNvGrpSpPr/>
+        <p:nvPr/>
+      </p:nvGrpSpPr>
+      <p:grpSpPr>
+        <a:xfrm>
+          <a:off x="0" y="0"/>
+          <a:ext cx="0" cy="0"/>
+          <a:chOff x="0" y="0"/>
+          <a:chExt cx="0" cy="0"/>
+        </a:xfrm>
+      </p:grpSpPr>
+      <p:sp>
+        <p:nvSpPr>
+          <p:cNvPr id="2" name="Slide Image Placeholder 1"/>
+          <p:cNvSpPr>
+            <a:spLocks noGrp="1" noRot="1" noChangeAspect="1"/>
+          </p:cNvSpPr>
+          <p:nvPr>
+            <p:ph type="sldImg"/>
+          </p:nvPr>
+        </p:nvSpPr>
+        <p:spPr/>
+      </p:sp>
+      <p:sp>
+        <p:nvSpPr>
+          <p:cNvPr id="3" name="Notes Placeholder 2"/>
+          <p:cNvSpPr>
+            <a:spLocks noGrp="1"/>
+          </p:cNvSpPr>
+          <p:nvPr>
+            <p:ph type="body" idx="1"/>
+          </p:nvPr>
+        </p:nvSpPr>
+        <p:spPr/>
+        <p:txBody>
+          <a:bodyPr/>
+          <a:lstStyle/>
+          <a:p>
+            <a:pPr marL="0" marR="0" lvl="1" indent="0" algn="l" defTabSz="914400" rtl="0" eaLnBrk="1" fontAlgn="auto" latinLnBrk="0" hangingPunct="1">
+              <a:lnSpc>
+                <a:spcPct val="100000"/>
+              </a:lnSpc>
+              <a:spcBef>
+                <a:spcPts val="0"/>
+              </a:spcBef>
+              <a:spcAft>
+                <a:spcPts val="0"/>
+              </a:spcAft>
+              <a:buClrTx/>
+              <a:buSzTx/>
+              <a:buFontTx/>
+              <a:buNone/>
+              <a:tabLst/>
+              <a:defRPr/>
+            </a:pPr>
+            <a:r>
+              <a:rPr lang="en-US" dirty="0" smtClean="0"/>
+              <a:t>Tests: *comparison of shipping a known defect versus delay cost may come into play</a:t>
+            </a:r>
+          </a:p>
+          <a:p>
+            <a:r>
+              <a:rPr lang="en-US" dirty="0" smtClean="0"/>
+              <a:t>CI:</a:t>
+            </a:r>
+            <a:r>
+              <a:rPr lang="en-US" baseline="0" dirty="0" smtClean="0"/>
+              <a:t> if tests do not pass all changes are discarded</a:t>
+            </a:r>
+            <a:endParaRPr lang="en-US" dirty="0"/>
+          </a:p>
+        </p:txBody>
+      </p:sp>
+      <p:sp>
+        <p:nvSpPr>
+          <p:cNvPr id="4" name="Slide Number Placeholder 3"/>
+          <p:cNvSpPr>
+            <a:spLocks noGrp="1"/>
+          </p:cNvSpPr>
+          <p:nvPr>
+            <p:ph type="sldNum" sz="quarter" idx="10"/>
+          </p:nvPr>
+        </p:nvSpPr>
+        <p:spPr/>
+        <p:txBody>
+          <a:bodyPr/>
+          <a:lstStyle/>
+          <a:p>
+            <a:fld id="{7892A9F2-C641-4649-AAAB-23CA8069F891}" type="slidenum">
+              <a:rPr lang="en-US" smtClean="0"/>
+              <a:t>5</a:t>
+            </a:fld>
+            <a:endParaRPr lang="en-US" dirty="0"/>
+          </a:p>
+        </p:txBody>
+      </p:sp>
+    </p:spTree>
+    <p:extLst>
+      <p:ext uri="{BB962C8B-B14F-4D97-AF65-F5344CB8AC3E}">
+        <p14:creationId xmlns:p14="http://schemas.microsoft.com/office/powerpoint/2010/main" val="3576461718"/>
+      </p:ext>
+    </p:extLst>
+  </p:cSld>
+  <p:clrMapOvr>
+    <a:masterClrMapping/>
+  </p:clrMapOvr>
+</p:notes>
+</file>
+
+<file path=ppt/notesSlides/notesSlide6.xml><?xml version="1.0" encoding="utf-8"?>
+<p:notes xmlns:a="http://schemas.openxmlformats.org/drawingml/2006/main" xmlns:r="http://schemas.openxmlformats.org/officeDocument/2006/relationships" xmlns:p="http://schemas.openxmlformats.org/presentationml/2006/main">
+  <p:cSld>
+    <p:spTree>
+      <p:nvGrpSpPr>
+        <p:cNvPr id="1" name=""/>
+        <p:cNvGrpSpPr/>
+        <p:nvPr/>
+      </p:nvGrpSpPr>
+      <p:grpSpPr>
+        <a:xfrm>
+          <a:off x="0" y="0"/>
+          <a:ext cx="0" cy="0"/>
+          <a:chOff x="0" y="0"/>
+          <a:chExt cx="0" cy="0"/>
+        </a:xfrm>
+      </p:grpSpPr>
+      <p:sp>
+        <p:nvSpPr>
+          <p:cNvPr id="2" name="Slide Image Placeholder 1"/>
+          <p:cNvSpPr>
+            <a:spLocks noGrp="1" noRot="1" noChangeAspect="1"/>
+          </p:cNvSpPr>
+          <p:nvPr>
+            <p:ph type="sldImg"/>
+          </p:nvPr>
+        </p:nvSpPr>
+        <p:spPr/>
+      </p:sp>
+      <p:sp>
+        <p:nvSpPr>
+          <p:cNvPr id="3" name="Notes Placeholder 2"/>
+          <p:cNvSpPr>
+            <a:spLocks noGrp="1"/>
+          </p:cNvSpPr>
+          <p:nvPr>
+            <p:ph type="body" idx="1"/>
+          </p:nvPr>
+        </p:nvSpPr>
+        <p:spPr/>
+        <p:txBody>
+          <a:bodyPr/>
+          <a:lstStyle/>
+          <a:p>
             <a:r>
               <a:rPr lang="en-US" dirty="0" smtClean="0"/>
               <a:t>40-hour</a:t>
@@ -885,9 +1810,9 @@
           <a:p>
             <a:fld id="{7892A9F2-C641-4649-AAAB-23CA8069F891}" type="slidenum">
               <a:rPr lang="en-US" smtClean="0"/>
-              <a:t>7</a:t>
+              <a:t>6</a:t>
             </a:fld>
-            <a:endParaRPr lang="en-US"/>
+            <a:endParaRPr lang="en-US" dirty="0"/>
           </a:p>
         </p:txBody>
       </p:sp>
@@ -895,6 +1820,258 @@
     <p:extLst>
       <p:ext uri="{BB962C8B-B14F-4D97-AF65-F5344CB8AC3E}">
         <p14:creationId xmlns:p14="http://schemas.microsoft.com/office/powerpoint/2010/main" val="765154015"/>
+      </p:ext>
+    </p:extLst>
+  </p:cSld>
+  <p:clrMapOvr>
+    <a:masterClrMapping/>
+  </p:clrMapOvr>
+</p:notes>
+</file>
+
+<file path=ppt/notesSlides/notesSlide7.xml><?xml version="1.0" encoding="utf-8"?>
+<p:notes xmlns:a="http://schemas.openxmlformats.org/drawingml/2006/main" xmlns:r="http://schemas.openxmlformats.org/officeDocument/2006/relationships" xmlns:p="http://schemas.openxmlformats.org/presentationml/2006/main">
+  <p:cSld>
+    <p:spTree>
+      <p:nvGrpSpPr>
+        <p:cNvPr id="1" name=""/>
+        <p:cNvGrpSpPr/>
+        <p:nvPr/>
+      </p:nvGrpSpPr>
+      <p:grpSpPr>
+        <a:xfrm>
+          <a:off x="0" y="0"/>
+          <a:ext cx="0" cy="0"/>
+          <a:chOff x="0" y="0"/>
+          <a:chExt cx="0" cy="0"/>
+        </a:xfrm>
+      </p:grpSpPr>
+      <p:sp>
+        <p:nvSpPr>
+          <p:cNvPr id="2" name="Slide Image Placeholder 1"/>
+          <p:cNvSpPr>
+            <a:spLocks noGrp="1" noRot="1" noChangeAspect="1"/>
+          </p:cNvSpPr>
+          <p:nvPr>
+            <p:ph type="sldImg"/>
+          </p:nvPr>
+        </p:nvSpPr>
+        <p:spPr/>
+      </p:sp>
+      <p:sp>
+        <p:nvSpPr>
+          <p:cNvPr id="3" name="Notes Placeholder 2"/>
+          <p:cNvSpPr>
+            <a:spLocks noGrp="1"/>
+          </p:cNvSpPr>
+          <p:nvPr>
+            <p:ph type="body" idx="1"/>
+          </p:nvPr>
+        </p:nvSpPr>
+        <p:spPr/>
+        <p:txBody>
+          <a:bodyPr/>
+          <a:lstStyle/>
+          <a:p>
+            <a:endParaRPr lang="en-US"/>
+          </a:p>
+        </p:txBody>
+      </p:sp>
+      <p:sp>
+        <p:nvSpPr>
+          <p:cNvPr id="4" name="Slide Number Placeholder 3"/>
+          <p:cNvSpPr>
+            <a:spLocks noGrp="1"/>
+          </p:cNvSpPr>
+          <p:nvPr>
+            <p:ph type="sldNum" sz="quarter" idx="10"/>
+          </p:nvPr>
+        </p:nvSpPr>
+        <p:spPr/>
+        <p:txBody>
+          <a:bodyPr/>
+          <a:lstStyle/>
+          <a:p>
+            <a:fld id="{7892A9F2-C641-4649-AAAB-23CA8069F891}" type="slidenum">
+              <a:rPr lang="en-US" smtClean="0"/>
+              <a:t>7</a:t>
+            </a:fld>
+            <a:endParaRPr lang="en-US" dirty="0"/>
+          </a:p>
+        </p:txBody>
+      </p:sp>
+    </p:spTree>
+    <p:extLst>
+      <p:ext uri="{BB962C8B-B14F-4D97-AF65-F5344CB8AC3E}">
+        <p14:creationId xmlns:p14="http://schemas.microsoft.com/office/powerpoint/2010/main" val="2446072248"/>
+      </p:ext>
+    </p:extLst>
+  </p:cSld>
+  <p:clrMapOvr>
+    <a:masterClrMapping/>
+  </p:clrMapOvr>
+</p:notes>
+</file>
+
+<file path=ppt/notesSlides/notesSlide8.xml><?xml version="1.0" encoding="utf-8"?>
+<p:notes xmlns:a="http://schemas.openxmlformats.org/drawingml/2006/main" xmlns:r="http://schemas.openxmlformats.org/officeDocument/2006/relationships" xmlns:p="http://schemas.openxmlformats.org/presentationml/2006/main">
+  <p:cSld>
+    <p:spTree>
+      <p:nvGrpSpPr>
+        <p:cNvPr id="1" name=""/>
+        <p:cNvGrpSpPr/>
+        <p:nvPr/>
+      </p:nvGrpSpPr>
+      <p:grpSpPr>
+        <a:xfrm>
+          <a:off x="0" y="0"/>
+          <a:ext cx="0" cy="0"/>
+          <a:chOff x="0" y="0"/>
+          <a:chExt cx="0" cy="0"/>
+        </a:xfrm>
+      </p:grpSpPr>
+      <p:sp>
+        <p:nvSpPr>
+          <p:cNvPr id="2" name="Slide Image Placeholder 1"/>
+          <p:cNvSpPr>
+            <a:spLocks noGrp="1" noRot="1" noChangeAspect="1"/>
+          </p:cNvSpPr>
+          <p:nvPr>
+            <p:ph type="sldImg"/>
+          </p:nvPr>
+        </p:nvSpPr>
+        <p:spPr/>
+      </p:sp>
+      <p:sp>
+        <p:nvSpPr>
+          <p:cNvPr id="3" name="Notes Placeholder 2"/>
+          <p:cNvSpPr>
+            <a:spLocks noGrp="1"/>
+          </p:cNvSpPr>
+          <p:nvPr>
+            <p:ph type="body" idx="1"/>
+          </p:nvPr>
+        </p:nvSpPr>
+        <p:spPr/>
+        <p:txBody>
+          <a:bodyPr/>
+          <a:lstStyle/>
+          <a:p>
+            <a:endParaRPr lang="en-US"/>
+          </a:p>
+        </p:txBody>
+      </p:sp>
+      <p:sp>
+        <p:nvSpPr>
+          <p:cNvPr id="4" name="Slide Number Placeholder 3"/>
+          <p:cNvSpPr>
+            <a:spLocks noGrp="1"/>
+          </p:cNvSpPr>
+          <p:nvPr>
+            <p:ph type="sldNum" sz="quarter" idx="10"/>
+          </p:nvPr>
+        </p:nvSpPr>
+        <p:spPr/>
+        <p:txBody>
+          <a:bodyPr/>
+          <a:lstStyle/>
+          <a:p>
+            <a:fld id="{7892A9F2-C641-4649-AAAB-23CA8069F891}" type="slidenum">
+              <a:rPr lang="en-US" smtClean="0"/>
+              <a:t>8</a:t>
+            </a:fld>
+            <a:endParaRPr lang="en-US" dirty="0"/>
+          </a:p>
+        </p:txBody>
+      </p:sp>
+    </p:spTree>
+    <p:extLst>
+      <p:ext uri="{BB962C8B-B14F-4D97-AF65-F5344CB8AC3E}">
+        <p14:creationId xmlns:p14="http://schemas.microsoft.com/office/powerpoint/2010/main" val="3405772746"/>
+      </p:ext>
+    </p:extLst>
+  </p:cSld>
+  <p:clrMapOvr>
+    <a:masterClrMapping/>
+  </p:clrMapOvr>
+</p:notes>
+</file>
+
+<file path=ppt/notesSlides/notesSlide9.xml><?xml version="1.0" encoding="utf-8"?>
+<p:notes xmlns:a="http://schemas.openxmlformats.org/drawingml/2006/main" xmlns:r="http://schemas.openxmlformats.org/officeDocument/2006/relationships" xmlns:p="http://schemas.openxmlformats.org/presentationml/2006/main">
+  <p:cSld>
+    <p:spTree>
+      <p:nvGrpSpPr>
+        <p:cNvPr id="1" name=""/>
+        <p:cNvGrpSpPr/>
+        <p:nvPr/>
+      </p:nvGrpSpPr>
+      <p:grpSpPr>
+        <a:xfrm>
+          <a:off x="0" y="0"/>
+          <a:ext cx="0" cy="0"/>
+          <a:chOff x="0" y="0"/>
+          <a:chExt cx="0" cy="0"/>
+        </a:xfrm>
+      </p:grpSpPr>
+      <p:sp>
+        <p:nvSpPr>
+          <p:cNvPr id="2" name="Slide Image Placeholder 1"/>
+          <p:cNvSpPr>
+            <a:spLocks noGrp="1" noRot="1" noChangeAspect="1"/>
+          </p:cNvSpPr>
+          <p:nvPr>
+            <p:ph type="sldImg"/>
+          </p:nvPr>
+        </p:nvSpPr>
+        <p:spPr/>
+      </p:sp>
+      <p:sp>
+        <p:nvSpPr>
+          <p:cNvPr id="3" name="Notes Placeholder 2"/>
+          <p:cNvSpPr>
+            <a:spLocks noGrp="1"/>
+          </p:cNvSpPr>
+          <p:nvPr>
+            <p:ph type="body" idx="1"/>
+          </p:nvPr>
+        </p:nvSpPr>
+        <p:spPr/>
+        <p:txBody>
+          <a:bodyPr/>
+          <a:lstStyle/>
+          <a:p>
+            <a:endParaRPr lang="en-US"/>
+          </a:p>
+        </p:txBody>
+      </p:sp>
+      <p:sp>
+        <p:nvSpPr>
+          <p:cNvPr id="4" name="Slide Number Placeholder 3"/>
+          <p:cNvSpPr>
+            <a:spLocks noGrp="1"/>
+          </p:cNvSpPr>
+          <p:nvPr>
+            <p:ph type="sldNum" sz="quarter" idx="10"/>
+          </p:nvPr>
+        </p:nvSpPr>
+        <p:spPr/>
+        <p:txBody>
+          <a:bodyPr/>
+          <a:lstStyle/>
+          <a:p>
+            <a:fld id="{7892A9F2-C641-4649-AAAB-23CA8069F891}" type="slidenum">
+              <a:rPr lang="en-US" smtClean="0"/>
+              <a:t>9</a:t>
+            </a:fld>
+            <a:endParaRPr lang="en-US" dirty="0"/>
+          </a:p>
+        </p:txBody>
+      </p:sp>
+    </p:spTree>
+    <p:extLst>
+      <p:ext uri="{BB962C8B-B14F-4D97-AF65-F5344CB8AC3E}">
+        <p14:creationId xmlns:p14="http://schemas.microsoft.com/office/powerpoint/2010/main" val="3738866087"/>
       </p:ext>
     </p:extLst>
   </p:cSld>
@@ -992,7 +2169,7 @@
             <a:lstStyle/>
             <a:p>
               <a:pPr algn="ctr"/>
-              <a:endParaRPr lang="en-US"/>
+              <a:endParaRPr lang="en-US" dirty="0"/>
             </a:p>
           </p:txBody>
         </p:sp>
@@ -1053,7 +2230,7 @@
             <a:lstStyle/>
             <a:p>
               <a:pPr algn="ctr"/>
-              <a:endParaRPr lang="en-US"/>
+              <a:endParaRPr lang="en-US" dirty="0"/>
             </a:p>
           </p:txBody>
         </p:sp>
@@ -1187,7 +2364,7 @@
           <a:lstStyle/>
           <a:p>
             <a:pPr algn="ctr"/>
-            <a:endParaRPr lang="en-US"/>
+            <a:endParaRPr lang="en-US" dirty="0"/>
           </a:p>
         </p:txBody>
       </p:sp>
@@ -1243,7 +2420,7 @@
           <a:lstStyle/>
           <a:p>
             <a:pPr algn="ctr"/>
-            <a:endParaRPr lang="en-US"/>
+            <a:endParaRPr lang="en-US" dirty="0"/>
           </a:p>
         </p:txBody>
       </p:sp>
@@ -1302,7 +2479,7 @@
           <a:lstStyle/>
           <a:p>
             <a:pPr algn="ctr"/>
-            <a:endParaRPr lang="en-US"/>
+            <a:endParaRPr lang="en-US" dirty="0"/>
           </a:p>
         </p:txBody>
       </p:sp>
@@ -1531,9 +2708,9 @@
           <a:p>
             <a:fld id="{F7309E30-C05F-4EBB-B765-3C3D85B243AC}" type="datetimeFigureOut">
               <a:rPr lang="en-US" smtClean="0"/>
-              <a:t>01-Mar-2016</a:t>
+              <a:t>01-Mar-16</a:t>
             </a:fld>
-            <a:endParaRPr lang="en-US"/>
+            <a:endParaRPr lang="en-US" dirty="0"/>
           </a:p>
         </p:txBody>
       </p:sp>
@@ -1557,7 +2734,7 @@
           <a:bodyPr/>
           <a:lstStyle/>
           <a:p>
-            <a:endParaRPr lang="en-US"/>
+            <a:endParaRPr lang="en-US" dirty="0"/>
           </a:p>
         </p:txBody>
       </p:sp>
@@ -1589,7 +2766,7 @@
               <a:rPr lang="en-US" smtClean="0"/>
               <a:t>‹#›</a:t>
             </a:fld>
-            <a:endParaRPr lang="en-US"/>
+            <a:endParaRPr lang="en-US" dirty="0"/>
           </a:p>
         </p:txBody>
       </p:sp>
@@ -1710,9 +2887,9 @@
           <a:p>
             <a:fld id="{F7309E30-C05F-4EBB-B765-3C3D85B243AC}" type="datetimeFigureOut">
               <a:rPr lang="en-US" smtClean="0"/>
-              <a:t>01-Mar-2016</a:t>
+              <a:t>01-Mar-16</a:t>
             </a:fld>
-            <a:endParaRPr lang="en-US"/>
+            <a:endParaRPr lang="en-US" dirty="0"/>
           </a:p>
         </p:txBody>
       </p:sp>
@@ -1731,7 +2908,7 @@
           <a:bodyPr/>
           <a:lstStyle/>
           <a:p>
-            <a:endParaRPr lang="en-US"/>
+            <a:endParaRPr lang="en-US" dirty="0"/>
           </a:p>
         </p:txBody>
       </p:sp>
@@ -1754,7 +2931,7 @@
               <a:rPr lang="en-US" smtClean="0"/>
               <a:t>‹#›</a:t>
             </a:fld>
-            <a:endParaRPr lang="en-US"/>
+            <a:endParaRPr lang="en-US" dirty="0"/>
           </a:p>
         </p:txBody>
       </p:sp>
@@ -1889,9 +3066,9 @@
           <a:p>
             <a:fld id="{F7309E30-C05F-4EBB-B765-3C3D85B243AC}" type="datetimeFigureOut">
               <a:rPr lang="en-US" smtClean="0"/>
-              <a:t>01-Mar-2016</a:t>
+              <a:t>01-Mar-16</a:t>
             </a:fld>
-            <a:endParaRPr lang="en-US"/>
+            <a:endParaRPr lang="en-US" dirty="0"/>
           </a:p>
         </p:txBody>
       </p:sp>
@@ -1910,7 +3087,7 @@
           <a:bodyPr/>
           <a:lstStyle/>
           <a:p>
-            <a:endParaRPr lang="en-US"/>
+            <a:endParaRPr lang="en-US" dirty="0"/>
           </a:p>
         </p:txBody>
       </p:sp>
@@ -1933,7 +3110,7 @@
               <a:rPr lang="en-US" smtClean="0"/>
               <a:t>‹#›</a:t>
             </a:fld>
-            <a:endParaRPr lang="en-US"/>
+            <a:endParaRPr lang="en-US" dirty="0"/>
           </a:p>
         </p:txBody>
       </p:sp>
@@ -2054,9 +3231,9 @@
           <a:p>
             <a:fld id="{F7309E30-C05F-4EBB-B765-3C3D85B243AC}" type="datetimeFigureOut">
               <a:rPr lang="en-US" smtClean="0"/>
-              <a:t>01-Mar-2016</a:t>
+              <a:t>01-Mar-16</a:t>
             </a:fld>
-            <a:endParaRPr lang="en-US"/>
+            <a:endParaRPr lang="en-US" dirty="0"/>
           </a:p>
         </p:txBody>
       </p:sp>
@@ -2075,7 +3252,7 @@
           <a:bodyPr/>
           <a:lstStyle/>
           <a:p>
-            <a:endParaRPr lang="en-US"/>
+            <a:endParaRPr lang="en-US" dirty="0"/>
           </a:p>
         </p:txBody>
       </p:sp>
@@ -2098,7 +3275,7 @@
               <a:rPr lang="en-US" smtClean="0"/>
               <a:t>‹#›</a:t>
             </a:fld>
-            <a:endParaRPr lang="en-US"/>
+            <a:endParaRPr lang="en-US" dirty="0"/>
           </a:p>
         </p:txBody>
       </p:sp>
@@ -2293,9 +3470,9 @@
           <a:p>
             <a:fld id="{F7309E30-C05F-4EBB-B765-3C3D85B243AC}" type="datetimeFigureOut">
               <a:rPr lang="en-US" smtClean="0"/>
-              <a:t>01-Mar-2016</a:t>
+              <a:t>01-Mar-16</a:t>
             </a:fld>
-            <a:endParaRPr lang="en-US"/>
+            <a:endParaRPr lang="en-US" dirty="0"/>
           </a:p>
         </p:txBody>
       </p:sp>
@@ -2314,7 +3491,7 @@
           <a:bodyPr/>
           <a:lstStyle/>
           <a:p>
-            <a:endParaRPr lang="en-US"/>
+            <a:endParaRPr lang="en-US" dirty="0"/>
           </a:p>
         </p:txBody>
       </p:sp>
@@ -2337,7 +3514,7 @@
               <a:rPr lang="en-US" smtClean="0"/>
               <a:t>‹#›</a:t>
             </a:fld>
-            <a:endParaRPr lang="en-US"/>
+            <a:endParaRPr lang="en-US" dirty="0"/>
           </a:p>
         </p:txBody>
       </p:sp>
@@ -2406,9 +3583,9 @@
           <a:p>
             <a:fld id="{F7309E30-C05F-4EBB-B765-3C3D85B243AC}" type="datetimeFigureOut">
               <a:rPr lang="en-US" smtClean="0"/>
-              <a:t>01-Mar-2016</a:t>
+              <a:t>01-Mar-16</a:t>
             </a:fld>
-            <a:endParaRPr lang="en-US"/>
+            <a:endParaRPr lang="en-US" dirty="0"/>
           </a:p>
         </p:txBody>
       </p:sp>
@@ -2427,7 +3604,7 @@
           <a:bodyPr/>
           <a:lstStyle/>
           <a:p>
-            <a:endParaRPr lang="en-US"/>
+            <a:endParaRPr lang="en-US" dirty="0"/>
           </a:p>
         </p:txBody>
       </p:sp>
@@ -2450,7 +3627,7 @@
               <a:rPr lang="en-US" smtClean="0"/>
               <a:t>‹#›</a:t>
             </a:fld>
-            <a:endParaRPr lang="en-US"/>
+            <a:endParaRPr lang="en-US" dirty="0"/>
           </a:p>
         </p:txBody>
       </p:sp>
@@ -2779,9 +3956,9 @@
           <a:p>
             <a:fld id="{F7309E30-C05F-4EBB-B765-3C3D85B243AC}" type="datetimeFigureOut">
               <a:rPr lang="en-US" smtClean="0"/>
-              <a:t>01-Mar-2016</a:t>
+              <a:t>01-Mar-16</a:t>
             </a:fld>
-            <a:endParaRPr lang="en-US"/>
+            <a:endParaRPr lang="en-US" dirty="0"/>
           </a:p>
         </p:txBody>
       </p:sp>
@@ -2800,7 +3977,7 @@
           <a:bodyPr/>
           <a:lstStyle/>
           <a:p>
-            <a:endParaRPr lang="en-US"/>
+            <a:endParaRPr lang="en-US" dirty="0"/>
           </a:p>
         </p:txBody>
       </p:sp>
@@ -2823,7 +4000,7 @@
               <a:rPr lang="en-US" smtClean="0"/>
               <a:t>‹#›</a:t>
             </a:fld>
-            <a:endParaRPr lang="en-US"/>
+            <a:endParaRPr lang="en-US" dirty="0"/>
           </a:p>
         </p:txBody>
       </p:sp>
@@ -3006,9 +4183,9 @@
           <a:p>
             <a:fld id="{F7309E30-C05F-4EBB-B765-3C3D85B243AC}" type="datetimeFigureOut">
               <a:rPr lang="en-US" smtClean="0"/>
-              <a:t>01-Mar-2016</a:t>
+              <a:t>01-Mar-16</a:t>
             </a:fld>
-            <a:endParaRPr lang="en-US"/>
+            <a:endParaRPr lang="en-US" dirty="0"/>
           </a:p>
         </p:txBody>
       </p:sp>
@@ -3027,7 +4204,7 @@
           <a:bodyPr/>
           <a:lstStyle/>
           <a:p>
-            <a:endParaRPr lang="en-US"/>
+            <a:endParaRPr lang="en-US" dirty="0"/>
           </a:p>
         </p:txBody>
       </p:sp>
@@ -3050,7 +4227,7 @@
               <a:rPr lang="en-US" smtClean="0"/>
               <a:t>‹#›</a:t>
             </a:fld>
-            <a:endParaRPr lang="en-US"/>
+            <a:endParaRPr lang="en-US" dirty="0"/>
           </a:p>
         </p:txBody>
       </p:sp>
@@ -3096,9 +4273,9 @@
           <a:p>
             <a:fld id="{F7309E30-C05F-4EBB-B765-3C3D85B243AC}" type="datetimeFigureOut">
               <a:rPr lang="en-US" smtClean="0"/>
-              <a:t>01-Mar-2016</a:t>
+              <a:t>01-Mar-16</a:t>
             </a:fld>
-            <a:endParaRPr lang="en-US"/>
+            <a:endParaRPr lang="en-US" dirty="0"/>
           </a:p>
         </p:txBody>
       </p:sp>
@@ -3117,7 +4294,7 @@
           <a:bodyPr/>
           <a:lstStyle/>
           <a:p>
-            <a:endParaRPr lang="en-US"/>
+            <a:endParaRPr lang="en-US" dirty="0"/>
           </a:p>
         </p:txBody>
       </p:sp>
@@ -3140,7 +4317,7 @@
               <a:rPr lang="en-US" smtClean="0"/>
               <a:t>‹#›</a:t>
             </a:fld>
-            <a:endParaRPr lang="en-US"/>
+            <a:endParaRPr lang="en-US" dirty="0"/>
           </a:p>
         </p:txBody>
       </p:sp>
@@ -3240,7 +4417,7 @@
             <a:lstStyle/>
             <a:p>
               <a:pPr algn="ctr"/>
-              <a:endParaRPr lang="en-US"/>
+              <a:endParaRPr lang="en-US" dirty="0"/>
             </a:p>
           </p:txBody>
         </p:sp>
@@ -3301,7 +4478,7 @@
             <a:lstStyle/>
             <a:p>
               <a:pPr algn="ctr"/>
-              <a:endParaRPr lang="en-US"/>
+              <a:endParaRPr lang="en-US" dirty="0"/>
             </a:p>
           </p:txBody>
         </p:sp>
@@ -3435,7 +4612,7 @@
           <a:lstStyle/>
           <a:p>
             <a:pPr algn="ctr"/>
-            <a:endParaRPr lang="en-US"/>
+            <a:endParaRPr lang="en-US" dirty="0"/>
           </a:p>
         </p:txBody>
       </p:sp>
@@ -3488,7 +4665,7 @@
           <a:lstStyle/>
           <a:p>
             <a:pPr algn="ctr"/>
-            <a:endParaRPr lang="en-US"/>
+            <a:endParaRPr lang="en-US" dirty="0"/>
           </a:p>
         </p:txBody>
       </p:sp>
@@ -3547,7 +4724,7 @@
           <a:lstStyle/>
           <a:p>
             <a:pPr algn="ctr"/>
-            <a:endParaRPr lang="en-US"/>
+            <a:endParaRPr lang="en-US" dirty="0"/>
           </a:p>
         </p:txBody>
       </p:sp>
@@ -3600,7 +4777,7 @@
           <a:lstStyle/>
           <a:p>
             <a:pPr algn="ctr"/>
-            <a:endParaRPr lang="en-US"/>
+            <a:endParaRPr lang="en-US" dirty="0"/>
           </a:p>
         </p:txBody>
       </p:sp>
@@ -3659,7 +4836,7 @@
           <a:lstStyle/>
           <a:p>
             <a:pPr algn="ctr"/>
-            <a:endParaRPr lang="en-US"/>
+            <a:endParaRPr lang="en-US" dirty="0"/>
           </a:p>
         </p:txBody>
       </p:sp>
@@ -3923,9 +5100,9 @@
           <a:p>
             <a:fld id="{F7309E30-C05F-4EBB-B765-3C3D85B243AC}" type="datetimeFigureOut">
               <a:rPr lang="en-US" smtClean="0"/>
-              <a:t>01-Mar-2016</a:t>
+              <a:t>01-Mar-16</a:t>
             </a:fld>
-            <a:endParaRPr lang="en-US"/>
+            <a:endParaRPr lang="en-US" dirty="0"/>
           </a:p>
         </p:txBody>
       </p:sp>
@@ -3949,7 +5126,7 @@
           <a:bodyPr/>
           <a:lstStyle/>
           <a:p>
-            <a:endParaRPr lang="en-US"/>
+            <a:endParaRPr lang="en-US" dirty="0"/>
           </a:p>
         </p:txBody>
       </p:sp>
@@ -3977,7 +5154,7 @@
               <a:rPr lang="en-US" smtClean="0"/>
               <a:t>‹#›</a:t>
             </a:fld>
-            <a:endParaRPr lang="en-US"/>
+            <a:endParaRPr lang="en-US" dirty="0"/>
           </a:p>
         </p:txBody>
       </p:sp>
@@ -4077,7 +5254,7 @@
             <a:lstStyle/>
             <a:p>
               <a:pPr algn="ctr"/>
-              <a:endParaRPr lang="en-US"/>
+              <a:endParaRPr lang="en-US" dirty="0"/>
             </a:p>
           </p:txBody>
         </p:sp>
@@ -4138,7 +5315,7 @@
             <a:lstStyle/>
             <a:p>
               <a:pPr algn="ctr"/>
-              <a:endParaRPr lang="en-US"/>
+              <a:endParaRPr lang="en-US" dirty="0"/>
             </a:p>
           </p:txBody>
         </p:sp>
@@ -4272,7 +5449,7 @@
           <a:lstStyle/>
           <a:p>
             <a:pPr algn="ctr"/>
-            <a:endParaRPr lang="en-US"/>
+            <a:endParaRPr lang="en-US" dirty="0"/>
           </a:p>
         </p:txBody>
       </p:sp>
@@ -4325,7 +5502,7 @@
           <a:lstStyle/>
           <a:p>
             <a:pPr algn="ctr"/>
-            <a:endParaRPr lang="en-US"/>
+            <a:endParaRPr lang="en-US" dirty="0"/>
           </a:p>
         </p:txBody>
       </p:sp>
@@ -4384,7 +5561,7 @@
           <a:lstStyle/>
           <a:p>
             <a:pPr algn="ctr"/>
-            <a:endParaRPr lang="en-US"/>
+            <a:endParaRPr lang="en-US" dirty="0"/>
           </a:p>
         </p:txBody>
       </p:sp>
@@ -4437,7 +5614,7 @@
           <a:lstStyle/>
           <a:p>
             <a:pPr algn="ctr"/>
-            <a:endParaRPr lang="en-US"/>
+            <a:endParaRPr lang="en-US" dirty="0"/>
           </a:p>
         </p:txBody>
       </p:sp>
@@ -4496,7 +5673,7 @@
           <a:lstStyle/>
           <a:p>
             <a:pPr algn="ctr"/>
-            <a:endParaRPr lang="en-US"/>
+            <a:endParaRPr lang="en-US" dirty="0"/>
           </a:p>
         </p:txBody>
       </p:sp>
@@ -4658,10 +5835,10 @@
           </a:lstStyle>
           <a:p>
             <a:r>
-              <a:rPr lang="en-US" smtClean="0"/>
+              <a:rPr lang="en-US" dirty="0" smtClean="0"/>
               <a:t>Click icon to add picture</a:t>
             </a:r>
-            <a:endParaRPr lang="en-US"/>
+            <a:endParaRPr lang="en-US" dirty="0"/>
           </a:p>
         </p:txBody>
       </p:sp>
@@ -4754,9 +5931,9 @@
           <a:p>
             <a:fld id="{F7309E30-C05F-4EBB-B765-3C3D85B243AC}" type="datetimeFigureOut">
               <a:rPr lang="en-US" smtClean="0"/>
-              <a:t>01-Mar-2016</a:t>
+              <a:t>01-Mar-16</a:t>
             </a:fld>
-            <a:endParaRPr lang="en-US"/>
+            <a:endParaRPr lang="en-US" dirty="0"/>
           </a:p>
         </p:txBody>
       </p:sp>
@@ -4780,7 +5957,7 @@
           <a:bodyPr/>
           <a:lstStyle/>
           <a:p>
-            <a:endParaRPr lang="en-US"/>
+            <a:endParaRPr lang="en-US" dirty="0"/>
           </a:p>
         </p:txBody>
       </p:sp>
@@ -4808,7 +5985,7 @@
               <a:rPr lang="en-US" smtClean="0"/>
               <a:t>‹#›</a:t>
             </a:fld>
-            <a:endParaRPr lang="en-US"/>
+            <a:endParaRPr lang="en-US" dirty="0"/>
           </a:p>
         </p:txBody>
       </p:sp>
@@ -4913,7 +6090,7 @@
             <a:lstStyle/>
             <a:p>
               <a:pPr algn="ctr"/>
-              <a:endParaRPr lang="en-US"/>
+              <a:endParaRPr lang="en-US" dirty="0"/>
             </a:p>
           </p:txBody>
         </p:sp>
@@ -4974,7 +6151,7 @@
             <a:lstStyle/>
             <a:p>
               <a:pPr algn="ctr"/>
-              <a:endParaRPr lang="en-US"/>
+              <a:endParaRPr lang="en-US" dirty="0"/>
             </a:p>
           </p:txBody>
         </p:sp>
@@ -5108,7 +6285,7 @@
           <a:lstStyle/>
           <a:p>
             <a:pPr algn="ctr"/>
-            <a:endParaRPr lang="en-US"/>
+            <a:endParaRPr lang="en-US" dirty="0"/>
           </a:p>
         </p:txBody>
       </p:sp>
@@ -5164,7 +6341,7 @@
           <a:lstStyle/>
           <a:p>
             <a:pPr algn="ctr"/>
-            <a:endParaRPr lang="en-US"/>
+            <a:endParaRPr lang="en-US" dirty="0"/>
           </a:p>
         </p:txBody>
       </p:sp>
@@ -5223,7 +6400,7 @@
           <a:lstStyle/>
           <a:p>
             <a:pPr algn="ctr"/>
-            <a:endParaRPr lang="en-US"/>
+            <a:endParaRPr lang="en-US" dirty="0"/>
           </a:p>
         </p:txBody>
       </p:sp>
@@ -5408,9 +6585,9 @@
           <a:p>
             <a:fld id="{F7309E30-C05F-4EBB-B765-3C3D85B243AC}" type="datetimeFigureOut">
               <a:rPr lang="en-US" smtClean="0"/>
-              <a:t>01-Mar-2016</a:t>
+              <a:t>01-Mar-16</a:t>
             </a:fld>
-            <a:endParaRPr lang="en-US"/>
+            <a:endParaRPr lang="en-US" dirty="0"/>
           </a:p>
         </p:txBody>
       </p:sp>
@@ -5446,7 +6623,7 @@
             </a:lvl1pPr>
           </a:lstStyle>
           <a:p>
-            <a:endParaRPr lang="en-US"/>
+            <a:endParaRPr lang="en-US" dirty="0"/>
           </a:p>
         </p:txBody>
       </p:sp>
@@ -5486,7 +6663,7 @@
               <a:rPr lang="en-US" smtClean="0"/>
               <a:t>‹#›</a:t>
             </a:fld>
-            <a:endParaRPr lang="en-US"/>
+            <a:endParaRPr lang="en-US" dirty="0"/>
           </a:p>
         </p:txBody>
       </p:sp>
@@ -5975,18 +7152,10 @@
           <a:lstStyle/>
           <a:p>
             <a:r>
-              <a:rPr lang="en-US" dirty="0" smtClean="0">
-                <a:solidFill>
-                  <a:srgbClr val="FF0000"/>
-                </a:solidFill>
-              </a:rPr>
+              <a:rPr lang="en-US" dirty="0" smtClean="0"/>
               <a:t>Anatomy of XP – Release</a:t>
             </a:r>
-            <a:endParaRPr lang="en-US" dirty="0">
-              <a:solidFill>
-                <a:srgbClr val="FF0000"/>
-              </a:solidFill>
-            </a:endParaRPr>
+            <a:endParaRPr lang="en-US" dirty="0"/>
           </a:p>
         </p:txBody>
       </p:sp>
@@ -6002,9 +7171,62 @@
         </p:nvSpPr>
         <p:spPr/>
         <p:txBody>
-          <a:bodyPr/>
-          <a:lstStyle/>
-          <a:p>
+          <a:bodyPr>
+            <a:normAutofit fontScale="92500" lnSpcReduction="20000"/>
+          </a:bodyPr>
+          <a:lstStyle/>
+          <a:p>
+            <a:r>
+              <a:rPr lang="en-US" dirty="0" smtClean="0"/>
+              <a:t>Smallest set of most valuable stories as chosen by the customer</a:t>
+            </a:r>
+          </a:p>
+          <a:p>
+            <a:r>
+              <a:rPr lang="en-US" dirty="0" smtClean="0"/>
+              <a:t>Customer should think about:</a:t>
+            </a:r>
+          </a:p>
+          <a:p>
+            <a:pPr lvl="1"/>
+            <a:r>
+              <a:rPr lang="en-US" dirty="0" smtClean="0"/>
+              <a:t>Priorities</a:t>
+            </a:r>
+          </a:p>
+          <a:p>
+            <a:pPr lvl="1"/>
+            <a:r>
+              <a:rPr lang="en-US" dirty="0" smtClean="0"/>
+              <a:t>Cost</a:t>
+            </a:r>
+          </a:p>
+          <a:p>
+            <a:pPr lvl="1"/>
+            <a:r>
+              <a:rPr lang="en-US" dirty="0" smtClean="0"/>
+              <a:t>Budget</a:t>
+            </a:r>
+          </a:p>
+          <a:p>
+            <a:r>
+              <a:rPr lang="en-US" dirty="0" smtClean="0"/>
+              <a:t>Two main ways to choose stories for a release:</a:t>
+            </a:r>
+          </a:p>
+          <a:p>
+            <a:pPr lvl="1"/>
+            <a:r>
+              <a:rPr lang="en-US" dirty="0" smtClean="0"/>
+              <a:t>Customer picks a set of stories and has the programmers calculate the finish date</a:t>
+            </a:r>
+          </a:p>
+          <a:p>
+            <a:pPr lvl="1"/>
+            <a:r>
+              <a:rPr lang="en-US" dirty="0" smtClean="0"/>
+              <a:t>Pick a date, have the programmers calculate the budget, and then choose stories</a:t>
+            </a:r>
             <a:endParaRPr lang="en-US" dirty="0"/>
           </a:p>
         </p:txBody>
@@ -6057,18 +7279,10 @@
           <a:lstStyle/>
           <a:p>
             <a:r>
-              <a:rPr lang="en-US" dirty="0" smtClean="0">
-                <a:solidFill>
-                  <a:srgbClr val="FF0000"/>
-                </a:solidFill>
-              </a:rPr>
+              <a:rPr lang="en-US" dirty="0" smtClean="0"/>
               <a:t>Anatomy of XP – Iteration</a:t>
             </a:r>
-            <a:endParaRPr lang="en-US" dirty="0">
-              <a:solidFill>
-                <a:srgbClr val="FF0000"/>
-              </a:solidFill>
-            </a:endParaRPr>
+            <a:endParaRPr lang="en-US" dirty="0"/>
           </a:p>
         </p:txBody>
       </p:sp>
@@ -6084,10 +7298,66 @@
         </p:nvSpPr>
         <p:spPr/>
         <p:txBody>
-          <a:bodyPr/>
-          <a:lstStyle/>
-          <a:p>
-            <a:endParaRPr lang="en-US" dirty="0"/>
+          <a:bodyPr>
+            <a:normAutofit fontScale="70000" lnSpcReduction="20000"/>
+          </a:bodyPr>
+          <a:lstStyle/>
+          <a:p>
+            <a:r>
+              <a:rPr lang="en-US" dirty="0" smtClean="0"/>
+              <a:t>Customer picks the most valuable stories from those remaining in the release</a:t>
+            </a:r>
+          </a:p>
+          <a:p>
+            <a:r>
+              <a:rPr lang="en-US" dirty="0" smtClean="0"/>
+              <a:t>Team breaks down stories into individual tasks</a:t>
+            </a:r>
+          </a:p>
+          <a:p>
+            <a:pPr lvl="1"/>
+            <a:r>
+              <a:rPr lang="en-US" dirty="0" smtClean="0"/>
+              <a:t>Can be completed in a few days</a:t>
+            </a:r>
+          </a:p>
+          <a:p>
+            <a:r>
+              <a:rPr lang="en-US" dirty="0" smtClean="0"/>
+              <a:t>Programmers assign themselves to the tasks they want to be responsible for completing</a:t>
+            </a:r>
+          </a:p>
+          <a:p>
+            <a:r>
+              <a:rPr lang="en-US" dirty="0" smtClean="0"/>
+              <a:t>Programmer responsible for the task generates an estimate</a:t>
+            </a:r>
+          </a:p>
+          <a:p>
+            <a:pPr lvl="1"/>
+            <a:r>
+              <a:rPr lang="en-US" dirty="0" smtClean="0"/>
+              <a:t>Once all estimates are complete, rebalance the load among programmers if necessary</a:t>
+            </a:r>
+          </a:p>
+          <a:p>
+            <a:r>
+              <a:rPr lang="en-US" dirty="0" smtClean="0"/>
+              <a:t>Programmers implement their tasks, integrating their code and tests with the current system</a:t>
+            </a:r>
+          </a:p>
+          <a:p>
+            <a:pPr lvl="1"/>
+            <a:r>
+              <a:rPr lang="en-US" dirty="0" smtClean="0"/>
+              <a:t>If tests do not run, the code is not integrated into the system</a:t>
+            </a:r>
+          </a:p>
+          <a:p>
+            <a:r>
+              <a:rPr lang="en-US" dirty="0" smtClean="0"/>
+              <a:t>While the team implements their tasks, the customer specifies functional tests</a:t>
+            </a:r>
           </a:p>
         </p:txBody>
       </p:sp>
@@ -6137,18 +7407,10 @@
           <a:lstStyle/>
           <a:p>
             <a:r>
-              <a:rPr lang="en-US" dirty="0" smtClean="0">
-                <a:solidFill>
-                  <a:srgbClr val="FF0000"/>
-                </a:solidFill>
-              </a:rPr>
+              <a:rPr lang="en-US" dirty="0" smtClean="0"/>
               <a:t>Anatomy of XP – Task</a:t>
             </a:r>
-            <a:endParaRPr lang="en-US" dirty="0">
-              <a:solidFill>
-                <a:srgbClr val="FF0000"/>
-              </a:solidFill>
-            </a:endParaRPr>
+            <a:endParaRPr lang="en-US" dirty="0"/>
           </a:p>
         </p:txBody>
       </p:sp>
@@ -6164,9 +7426,111 @@
         </p:nvSpPr>
         <p:spPr/>
         <p:txBody>
-          <a:bodyPr/>
-          <a:lstStyle/>
-          <a:p>
+          <a:bodyPr>
+            <a:normAutofit fontScale="55000" lnSpcReduction="20000"/>
+          </a:bodyPr>
+          <a:lstStyle/>
+          <a:p>
+            <a:r>
+              <a:rPr lang="en-US" dirty="0" smtClean="0"/>
+              <a:t>Programmer responsible for the task finds a partner</a:t>
+            </a:r>
+          </a:p>
+          <a:p>
+            <a:pPr lvl="1"/>
+            <a:r>
+              <a:rPr lang="en-US" dirty="0" smtClean="0"/>
+              <a:t>All production code is written with </a:t>
+            </a:r>
+            <a:r>
+              <a:rPr lang="en-US" i="1" dirty="0" smtClean="0"/>
+              <a:t>two</a:t>
+            </a:r>
+            <a:r>
+              <a:rPr lang="en-US" dirty="0" smtClean="0"/>
+              <a:t> people at </a:t>
+            </a:r>
+            <a:r>
+              <a:rPr lang="en-US" i="1" dirty="0" smtClean="0"/>
+              <a:t>one</a:t>
+            </a:r>
+            <a:r>
+              <a:rPr lang="en-US" dirty="0" smtClean="0"/>
+              <a:t> machine</a:t>
+            </a:r>
+          </a:p>
+          <a:p>
+            <a:r>
+              <a:rPr lang="en-US" dirty="0" smtClean="0"/>
+              <a:t>Questions about scope or implementation approach result in a short meeting with the customer and/or programmers most familiar/knowledgeable about the code to be touched in implementation</a:t>
+            </a:r>
+          </a:p>
+          <a:p>
+            <a:pPr lvl="1"/>
+            <a:r>
+              <a:rPr lang="en-US" dirty="0" smtClean="0"/>
+              <a:t>Partners condense list of test cases and prioritize by confidence in completion and what is to be learned about the task</a:t>
+            </a:r>
+          </a:p>
+          <a:p>
+            <a:r>
+              <a:rPr lang="en-US" dirty="0" smtClean="0"/>
+              <a:t>Test case is coded first before any code is touched</a:t>
+            </a:r>
+          </a:p>
+          <a:p>
+            <a:r>
+              <a:rPr lang="en-US" dirty="0" smtClean="0"/>
+              <a:t>If the test case doesn’t run and:</a:t>
+            </a:r>
+          </a:p>
+          <a:p>
+            <a:pPr lvl="1"/>
+            <a:r>
+              <a:rPr lang="en-US" dirty="0"/>
+              <a:t>T</a:t>
+            </a:r>
+            <a:r>
+              <a:rPr lang="en-US" dirty="0" smtClean="0"/>
+              <a:t>here is a clean way to make it run, refactor to make it run cleanly</a:t>
+            </a:r>
+          </a:p>
+          <a:p>
+            <a:pPr lvl="1"/>
+            <a:r>
+              <a:rPr lang="en-US" dirty="0"/>
+              <a:t>T</a:t>
+            </a:r>
+            <a:r>
+              <a:rPr lang="en-US" dirty="0" smtClean="0"/>
+              <a:t>here is an ugly way to make it run, but also a clean way that requires re-design, refactor to make it run cleanly</a:t>
+            </a:r>
+          </a:p>
+          <a:p>
+            <a:pPr lvl="1"/>
+            <a:r>
+              <a:rPr lang="en-US" dirty="0" smtClean="0"/>
+              <a:t>There is an ugly way to make it run and no clean way, make it run the ugly way</a:t>
+            </a:r>
+          </a:p>
+          <a:p>
+            <a:r>
+              <a:rPr lang="en-US" dirty="0" smtClean="0"/>
+              <a:t>After test cases are complete and run, if the system can be made cleaner/simpler, refactor to do so</a:t>
+            </a:r>
+          </a:p>
+          <a:p>
+            <a:r>
+              <a:rPr lang="en-US" dirty="0" smtClean="0"/>
+              <a:t>Note any additional test cases or bigger refactoring needed, but continue on plan</a:t>
+            </a:r>
+          </a:p>
+          <a:p>
+            <a:pPr lvl="1"/>
+            <a:r>
+              <a:rPr lang="en-US" dirty="0" smtClean="0"/>
+              <a:t>Goal is to remain focused on current task, but not lose the insights</a:t>
+            </a:r>
             <a:endParaRPr lang="en-US" dirty="0"/>
           </a:p>
         </p:txBody>
@@ -6217,18 +7581,10 @@
           <a:lstStyle/>
           <a:p>
             <a:r>
-              <a:rPr lang="en-US" dirty="0" smtClean="0">
-                <a:solidFill>
-                  <a:srgbClr val="FF0000"/>
-                </a:solidFill>
-              </a:rPr>
+              <a:rPr lang="en-US" dirty="0" smtClean="0"/>
               <a:t>Anatomy of XP – Test</a:t>
             </a:r>
-            <a:endParaRPr lang="en-US" dirty="0">
-              <a:solidFill>
-                <a:srgbClr val="FF0000"/>
-              </a:solidFill>
-            </a:endParaRPr>
+            <a:endParaRPr lang="en-US" dirty="0"/>
           </a:p>
         </p:txBody>
       </p:sp>
@@ -6244,9 +7600,69 @@
         </p:nvSpPr>
         <p:spPr/>
         <p:txBody>
-          <a:bodyPr/>
-          <a:lstStyle/>
-          <a:p>
+          <a:bodyPr>
+            <a:normAutofit fontScale="77500" lnSpcReduction="20000"/>
+          </a:bodyPr>
+          <a:lstStyle/>
+          <a:p>
+            <a:r>
+              <a:rPr lang="en-US" dirty="0" smtClean="0"/>
+              <a:t>Two twists on conventional unit testing:</a:t>
+            </a:r>
+          </a:p>
+          <a:p>
+            <a:pPr lvl="1"/>
+            <a:r>
+              <a:rPr lang="en-US" dirty="0" smtClean="0"/>
+              <a:t>Programmers write their own test cases</a:t>
+            </a:r>
+          </a:p>
+          <a:p>
+            <a:pPr lvl="1"/>
+            <a:r>
+              <a:rPr lang="en-US" dirty="0" smtClean="0"/>
+              <a:t>Programmers write the tests before they code</a:t>
+            </a:r>
+          </a:p>
+          <a:p>
+            <a:r>
+              <a:rPr lang="en-US" dirty="0"/>
+              <a:t>Addresses accepted wisdom that a programmer cannot </a:t>
+            </a:r>
+            <a:r>
+              <a:rPr lang="en-US" dirty="0" smtClean="0"/>
+              <a:t>effectively test </a:t>
+            </a:r>
+            <a:r>
+              <a:rPr lang="en-US" dirty="0"/>
+              <a:t>their own code by writing code in pairs</a:t>
+            </a:r>
+          </a:p>
+          <a:p>
+            <a:r>
+              <a:rPr lang="en-US" dirty="0" smtClean="0"/>
+              <a:t>Tests are permanently recorded and automatically run from that point onward</a:t>
+            </a:r>
+          </a:p>
+          <a:p>
+            <a:pPr lvl="1"/>
+            <a:r>
+              <a:rPr lang="en-US" dirty="0" smtClean="0"/>
+              <a:t>Programmers/team gain confidence in system behavior</a:t>
+            </a:r>
+          </a:p>
+          <a:p>
+            <a:r>
+              <a:rPr lang="en-US" dirty="0" smtClean="0"/>
+              <a:t>Customer created tests are converted into system-wide tests either by the customer or programmer</a:t>
+            </a:r>
+          </a:p>
+          <a:p>
+            <a:pPr lvl="1"/>
+            <a:r>
+              <a:rPr lang="en-US" dirty="0" smtClean="0"/>
+              <a:t>Customer gains confidence the system operates correctly</a:t>
+            </a:r>
             <a:endParaRPr lang="en-US" dirty="0"/>
           </a:p>
         </p:txBody>
@@ -6299,18 +7715,10 @@
           <a:lstStyle/>
           <a:p>
             <a:r>
-              <a:rPr lang="en-US" dirty="0" smtClean="0">
-                <a:solidFill>
-                  <a:srgbClr val="FF0000"/>
-                </a:solidFill>
-              </a:rPr>
+              <a:rPr lang="en-US" dirty="0" smtClean="0"/>
               <a:t>Common Failures</a:t>
             </a:r>
-            <a:endParaRPr lang="en-US" dirty="0">
-              <a:solidFill>
-                <a:srgbClr val="FF0000"/>
-              </a:solidFill>
-            </a:endParaRPr>
+            <a:endParaRPr lang="en-US" dirty="0"/>
           </a:p>
         </p:txBody>
       </p:sp>
@@ -6326,7 +7734,9 @@
         </p:nvSpPr>
         <p:spPr/>
         <p:txBody>
-          <a:bodyPr/>
+          <a:bodyPr>
+            <a:normAutofit fontScale="77500" lnSpcReduction="20000"/>
+          </a:bodyPr>
           <a:lstStyle/>
           <a:p>
             <a:r>
@@ -6335,21 +7745,70 @@
             </a:r>
           </a:p>
           <a:p>
+            <a:pPr lvl="1"/>
+            <a:r>
+              <a:rPr lang="en-US" dirty="0" smtClean="0"/>
+              <a:t>First try to solve the problem internally</a:t>
+            </a:r>
+          </a:p>
+          <a:p>
+            <a:pPr lvl="1"/>
+            <a:r>
+              <a:rPr lang="en-US" dirty="0" smtClean="0"/>
+              <a:t>Do not be afraid to ask the customer for relief</a:t>
+            </a:r>
+          </a:p>
+          <a:p>
             <a:r>
               <a:rPr lang="en-US" dirty="0" smtClean="0"/>
               <a:t>Uncooperative Customers</a:t>
             </a:r>
           </a:p>
           <a:p>
+            <a:pPr lvl="1"/>
+            <a:r>
+              <a:rPr lang="en-US" dirty="0" smtClean="0"/>
+              <a:t>Explain or demonstrate consequences to the customer</a:t>
+            </a:r>
+          </a:p>
+          <a:p>
+            <a:pPr lvl="1"/>
+            <a:r>
+              <a:rPr lang="en-US" dirty="0" smtClean="0"/>
+              <a:t>Completing iterations will gain their trust</a:t>
+            </a:r>
+          </a:p>
+          <a:p>
             <a:r>
               <a:rPr lang="en-US" dirty="0" smtClean="0"/>
               <a:t>Turnover</a:t>
             </a:r>
           </a:p>
           <a:p>
+            <a:pPr lvl="1"/>
+            <a:r>
+              <a:rPr lang="en-US" dirty="0" smtClean="0"/>
+              <a:t>Two people are involved in every code change</a:t>
+            </a:r>
+          </a:p>
+          <a:p>
+            <a:pPr lvl="1"/>
+            <a:r>
+              <a:rPr lang="en-US" dirty="0" smtClean="0"/>
+              <a:t>New people are paired with more experienced people until ready to accept responsibility for their own tasks</a:t>
+            </a:r>
+          </a:p>
+          <a:p>
             <a:r>
               <a:rPr lang="en-US" dirty="0" smtClean="0"/>
               <a:t>Changing Requirements</a:t>
+            </a:r>
+          </a:p>
+          <a:p>
+            <a:pPr lvl="1"/>
+            <a:r>
+              <a:rPr lang="en-US" dirty="0" smtClean="0"/>
+              <a:t>By designing for today, equally prepared for any direction taken in the future</a:t>
             </a:r>
             <a:endParaRPr lang="en-US" dirty="0"/>
           </a:p>
@@ -6401,18 +7860,10 @@
           <a:lstStyle/>
           <a:p>
             <a:r>
-              <a:rPr lang="en-US" dirty="0" smtClean="0">
-                <a:solidFill>
-                  <a:srgbClr val="FF0000"/>
-                </a:solidFill>
-              </a:rPr>
-              <a:t>Testaments to XP Success</a:t>
-            </a:r>
-            <a:endParaRPr lang="en-US" dirty="0">
-              <a:solidFill>
-                <a:srgbClr val="FF0000"/>
-              </a:solidFill>
-            </a:endParaRPr>
+              <a:rPr lang="en-US" dirty="0" smtClean="0"/>
+              <a:t>Testaments to Success</a:t>
+            </a:r>
+            <a:endParaRPr lang="en-US" dirty="0"/>
           </a:p>
         </p:txBody>
       </p:sp>
@@ -6428,20 +7879,14 @@
         </p:nvSpPr>
         <p:spPr/>
         <p:txBody>
-          <a:bodyPr/>
-          <a:lstStyle/>
-          <a:p>
-            <a:r>
-              <a:rPr lang="en-US" dirty="0" smtClean="0"/>
-              <a:t>Acxiom: Working toward a Common Goal (Jim </a:t>
-            </a:r>
-            <a:r>
-              <a:rPr lang="en-US" dirty="0" err="1" smtClean="0"/>
-              <a:t>Hannula</a:t>
-            </a:r>
-            <a:r>
-              <a:rPr lang="en-US" dirty="0" smtClean="0"/>
-              <a:t>, Acxiom)</a:t>
+          <a:bodyPr>
+            <a:normAutofit fontScale="62500" lnSpcReduction="20000"/>
+          </a:bodyPr>
+          <a:lstStyle/>
+          <a:p>
+            <a:r>
+              <a:rPr lang="en-US" dirty="0" smtClean="0"/>
+              <a:t>Working toward a Common Goal (Jim Hannula, Acxiom)</a:t>
             </a:r>
           </a:p>
           <a:p>
@@ -6464,6 +7909,75 @@
               <a:rPr lang="en-US" dirty="0" smtClean="0"/>
               <a:t>Time: 3 years</a:t>
             </a:r>
+          </a:p>
+          <a:p>
+            <a:pPr lvl="1"/>
+            <a:r>
+              <a:rPr lang="en-US" b="1" dirty="0"/>
+              <a:t>Takeaways</a:t>
+            </a:r>
+            <a:r>
+              <a:rPr lang="en-US" dirty="0"/>
+              <a:t>: Set developer/team expectations; All team members must buy into the approach or it does not work; Decide the direction and stand behind the hard </a:t>
+            </a:r>
+            <a:r>
+              <a:rPr lang="en-US" dirty="0" smtClean="0"/>
+              <a:t>decisions</a:t>
+            </a:r>
+          </a:p>
+          <a:p>
+            <a:r>
+              <a:rPr lang="en-US" dirty="0"/>
+              <a:t>The Best Team in the World (Chet Hendrickson, DaimlerChrysler)</a:t>
+            </a:r>
+          </a:p>
+          <a:p>
+            <a:pPr lvl="1"/>
+            <a:r>
+              <a:rPr lang="en-US" dirty="0"/>
+              <a:t>Team: 10 programmers, 15 total staff</a:t>
+            </a:r>
+          </a:p>
+          <a:p>
+            <a:pPr lvl="1"/>
+            <a:r>
+              <a:rPr lang="en-US" dirty="0"/>
+              <a:t>Application: Large-scale payroll system</a:t>
+            </a:r>
+          </a:p>
+          <a:p>
+            <a:pPr lvl="1"/>
+            <a:r>
+              <a:rPr lang="en-US" dirty="0"/>
+              <a:t>Time: 4 </a:t>
+            </a:r>
+            <a:r>
+              <a:rPr lang="en-US" dirty="0" smtClean="0"/>
+              <a:t>years</a:t>
+            </a:r>
+          </a:p>
+          <a:p>
+            <a:pPr lvl="1"/>
+            <a:r>
+              <a:rPr lang="en-US" b="1" dirty="0" smtClean="0"/>
+              <a:t>Takeaways</a:t>
+            </a:r>
+            <a:r>
+              <a:rPr lang="en-US" dirty="0" smtClean="0"/>
+              <a:t>: After 33 weeks the system was well factored and backed up by comprehensive set of unit tests giving the customer confidence it was ready to begin </a:t>
+            </a:r>
+            <a:r>
+              <a:rPr lang="en-US" dirty="0"/>
+              <a:t>performance tuning and parallel </a:t>
+            </a:r>
+            <a:r>
+              <a:rPr lang="en-US" dirty="0" smtClean="0"/>
+              <a:t>testing; Since the launch, new features and enhancements have been added with ease</a:t>
+            </a:r>
+            <a:endParaRPr lang="en-US" b="1" dirty="0"/>
+          </a:p>
+          <a:p>
+            <a:pPr lvl="1"/>
             <a:endParaRPr lang="en-US" dirty="0"/>
           </a:p>
         </p:txBody>
@@ -6510,22 +8024,16 @@
         </p:nvSpPr>
         <p:spPr/>
         <p:txBody>
-          <a:bodyPr/>
-          <a:lstStyle/>
-          <a:p>
-            <a:r>
-              <a:rPr lang="en-US" dirty="0" smtClean="0">
-                <a:solidFill>
-                  <a:srgbClr val="FF0000"/>
-                </a:solidFill>
-              </a:rPr>
-              <a:t>Testaments to XP Success</a:t>
-            </a:r>
-            <a:endParaRPr lang="en-US" dirty="0">
-              <a:solidFill>
-                <a:srgbClr val="FF0000"/>
-              </a:solidFill>
-            </a:endParaRPr>
+          <a:bodyPr>
+            <a:normAutofit fontScale="90000"/>
+          </a:bodyPr>
+          <a:lstStyle/>
+          <a:p>
+            <a:r>
+              <a:rPr lang="en-US" dirty="0" smtClean="0"/>
+              <a:t>Testaments to Success (cont.)</a:t>
+            </a:r>
+            <a:endParaRPr lang="en-US" dirty="0"/>
           </a:p>
         </p:txBody>
       </p:sp>
@@ -6541,35 +8049,102 @@
         </p:nvSpPr>
         <p:spPr/>
         <p:txBody>
-          <a:bodyPr/>
-          <a:lstStyle/>
-          <a:p>
-            <a:r>
-              <a:rPr lang="en-US" dirty="0" smtClean="0"/>
-              <a:t>DaimlerChrysler:  The Best Team in the World (Chet Hendrickson, DaimlerChrysler)</a:t>
+          <a:bodyPr>
+            <a:normAutofit fontScale="62500" lnSpcReduction="20000"/>
+          </a:bodyPr>
+          <a:lstStyle/>
+          <a:p>
+            <a:r>
+              <a:rPr lang="en-US" dirty="0" smtClean="0"/>
+              <a:t>A </a:t>
+            </a:r>
+            <a:r>
+              <a:rPr lang="en-US" dirty="0"/>
+              <a:t>Unique Combination of Agility and Quality (Don Wells, Ford Motor)</a:t>
             </a:r>
           </a:p>
           <a:p>
             <a:pPr lvl="1"/>
             <a:r>
-              <a:rPr lang="en-US" dirty="0" smtClean="0"/>
-              <a:t>Team: 10 programmers, 15 total staff</a:t>
+              <a:rPr lang="en-US" dirty="0"/>
+              <a:t>Team: 12 programmers, 17 total staff</a:t>
             </a:r>
           </a:p>
           <a:p>
             <a:pPr lvl="1"/>
             <a:r>
-              <a:rPr lang="en-US" dirty="0" smtClean="0"/>
-              <a:t>Application: Large-scale payroll system</a:t>
+              <a:rPr lang="en-US" dirty="0"/>
+              <a:t>Application: Cost analysis system</a:t>
             </a:r>
           </a:p>
           <a:p>
             <a:pPr lvl="1"/>
             <a:r>
-              <a:rPr lang="en-US" dirty="0" smtClean="0"/>
-              <a:t>Time: 4 years</a:t>
-            </a:r>
-            <a:endParaRPr lang="en-US" dirty="0"/>
+              <a:rPr lang="en-US" dirty="0"/>
+              <a:t>Time: 6 years</a:t>
+            </a:r>
+          </a:p>
+          <a:p>
+            <a:pPr lvl="1"/>
+            <a:r>
+              <a:rPr lang="en-US" b="1" dirty="0" smtClean="0"/>
+              <a:t>Takeaways</a:t>
+            </a:r>
+            <a:r>
+              <a:rPr lang="en-US" dirty="0" smtClean="0"/>
+              <a:t>: </a:t>
+            </a:r>
+            <a:r>
+              <a:rPr lang="en-US" dirty="0"/>
+              <a:t>Implemented XP a piece at a time to familiarize developers with process; After one year, automated testing covered 40% of the codebase and there was a 40% drop in bug reports; </a:t>
+            </a:r>
+            <a:r>
+              <a:rPr lang="en-US" dirty="0" smtClean="0"/>
+              <a:t>After a year and a half customers and managers noticed far greater system stability</a:t>
+            </a:r>
+          </a:p>
+          <a:p>
+            <a:r>
+              <a:rPr lang="en-US" dirty="0"/>
+              <a:t>Tariff System: Tests You Can Read (Rob Mee, Independent Consultant)</a:t>
+            </a:r>
+          </a:p>
+          <a:p>
+            <a:pPr lvl="1"/>
+            <a:r>
+              <a:rPr lang="en-US" dirty="0"/>
+              <a:t>Team: 3 developers</a:t>
+            </a:r>
+          </a:p>
+          <a:p>
+            <a:pPr lvl="1"/>
+            <a:r>
+              <a:rPr lang="en-US" dirty="0"/>
+              <a:t>Application: Shipping tariff calculation system</a:t>
+            </a:r>
+          </a:p>
+          <a:p>
+            <a:pPr lvl="1"/>
+            <a:r>
+              <a:rPr lang="en-US" dirty="0"/>
+              <a:t>Time: 3 months</a:t>
+            </a:r>
+          </a:p>
+          <a:p>
+            <a:pPr lvl="1"/>
+            <a:r>
+              <a:rPr lang="en-US" b="1" dirty="0"/>
+              <a:t>Takeaways:</a:t>
+            </a:r>
+            <a:r>
+              <a:rPr lang="en-US" dirty="0"/>
+              <a:t> Resolved to adhere to core XP practices of pair programming, simplest design possible, refactor aggressively, and write extensive unit tests; Writing test cases ahead helped bring designs into focus, enabling work to be complete faster; Determined a project role was necessary, a dedicated person to interact with the </a:t>
+            </a:r>
+            <a:r>
+              <a:rPr lang="en-US" dirty="0" smtClean="0"/>
+              <a:t>users</a:t>
+            </a:r>
+            <a:endParaRPr lang="en-US" b="1" dirty="0"/>
           </a:p>
         </p:txBody>
       </p:sp>
@@ -6619,224 +8194,6 @@
           <a:lstStyle/>
           <a:p>
             <a:r>
-              <a:rPr lang="en-US" dirty="0" smtClean="0">
-                <a:solidFill>
-                  <a:srgbClr val="FF0000"/>
-                </a:solidFill>
-              </a:rPr>
-              <a:t>Testaments to XP Success</a:t>
-            </a:r>
-            <a:endParaRPr lang="en-US" dirty="0">
-              <a:solidFill>
-                <a:srgbClr val="FF0000"/>
-              </a:solidFill>
-            </a:endParaRPr>
-          </a:p>
-        </p:txBody>
-      </p:sp>
-      <p:sp>
-        <p:nvSpPr>
-          <p:cNvPr id="3" name="Content Placeholder 2"/>
-          <p:cNvSpPr>
-            <a:spLocks noGrp="1"/>
-          </p:cNvSpPr>
-          <p:nvPr>
-            <p:ph idx="1"/>
-          </p:nvPr>
-        </p:nvSpPr>
-        <p:spPr/>
-        <p:txBody>
-          <a:bodyPr/>
-          <a:lstStyle/>
-          <a:p>
-            <a:r>
-              <a:rPr lang="en-US" dirty="0" smtClean="0"/>
-              <a:t>Ford Motor: A Unique Combination of Agility and Quality (Don Wells, Ford Motor)</a:t>
-            </a:r>
-          </a:p>
-          <a:p>
-            <a:pPr lvl="1"/>
-            <a:r>
-              <a:rPr lang="en-US" dirty="0" smtClean="0"/>
-              <a:t>Team: 12 programmers, 17 total staff</a:t>
-            </a:r>
-          </a:p>
-          <a:p>
-            <a:pPr lvl="1"/>
-            <a:r>
-              <a:rPr lang="en-US" dirty="0" smtClean="0"/>
-              <a:t>Application: Cost analysis system</a:t>
-            </a:r>
-          </a:p>
-          <a:p>
-            <a:pPr lvl="1"/>
-            <a:r>
-              <a:rPr lang="en-US" dirty="0" smtClean="0"/>
-              <a:t>Time: 6 years</a:t>
-            </a:r>
-            <a:endParaRPr lang="en-US" dirty="0"/>
-          </a:p>
-        </p:txBody>
-      </p:sp>
-    </p:spTree>
-    <p:extLst>
-      <p:ext uri="{BB962C8B-B14F-4D97-AF65-F5344CB8AC3E}">
-        <p14:creationId xmlns:p14="http://schemas.microsoft.com/office/powerpoint/2010/main" val="499268104"/>
-      </p:ext>
-    </p:extLst>
-  </p:cSld>
-  <p:clrMapOvr>
-    <a:masterClrMapping/>
-  </p:clrMapOvr>
-</p:sld>
-</file>
-
-<file path=ppt/slides/slide18.xml><?xml version="1.0" encoding="utf-8"?>
-<p:sld xmlns:a="http://schemas.openxmlformats.org/drawingml/2006/main" xmlns:r="http://schemas.openxmlformats.org/officeDocument/2006/relationships" xmlns:p="http://schemas.openxmlformats.org/presentationml/2006/main">
-  <p:cSld>
-    <p:spTree>
-      <p:nvGrpSpPr>
-        <p:cNvPr id="1" name=""/>
-        <p:cNvGrpSpPr/>
-        <p:nvPr/>
-      </p:nvGrpSpPr>
-      <p:grpSpPr>
-        <a:xfrm>
-          <a:off x="0" y="0"/>
-          <a:ext cx="0" cy="0"/>
-          <a:chOff x="0" y="0"/>
-          <a:chExt cx="0" cy="0"/>
-        </a:xfrm>
-      </p:grpSpPr>
-      <p:sp>
-        <p:nvSpPr>
-          <p:cNvPr id="2" name="Title 1"/>
-          <p:cNvSpPr>
-            <a:spLocks noGrp="1"/>
-          </p:cNvSpPr>
-          <p:nvPr>
-            <p:ph type="title"/>
-          </p:nvPr>
-        </p:nvSpPr>
-        <p:spPr/>
-        <p:txBody>
-          <a:bodyPr/>
-          <a:lstStyle/>
-          <a:p>
-            <a:r>
-              <a:rPr lang="en-US" dirty="0" smtClean="0">
-                <a:solidFill>
-                  <a:srgbClr val="FF0000"/>
-                </a:solidFill>
-              </a:rPr>
-              <a:t>Testaments to XP Success</a:t>
-            </a:r>
-            <a:endParaRPr lang="en-US" dirty="0">
-              <a:solidFill>
-                <a:srgbClr val="FF0000"/>
-              </a:solidFill>
-            </a:endParaRPr>
-          </a:p>
-        </p:txBody>
-      </p:sp>
-      <p:sp>
-        <p:nvSpPr>
-          <p:cNvPr id="3" name="Content Placeholder 2"/>
-          <p:cNvSpPr>
-            <a:spLocks noGrp="1"/>
-          </p:cNvSpPr>
-          <p:nvPr>
-            <p:ph idx="1"/>
-          </p:nvPr>
-        </p:nvSpPr>
-        <p:spPr/>
-        <p:txBody>
-          <a:bodyPr/>
-          <a:lstStyle/>
-          <a:p>
-            <a:r>
-              <a:rPr lang="en-US" dirty="0" smtClean="0"/>
-              <a:t>Tariff System: Tests You Can Read (Rob </a:t>
-            </a:r>
-            <a:r>
-              <a:rPr lang="en-US" dirty="0" err="1" smtClean="0"/>
-              <a:t>Mee</a:t>
-            </a:r>
-            <a:r>
-              <a:rPr lang="en-US" dirty="0" smtClean="0"/>
-              <a:t>, Independent Consultant)</a:t>
-            </a:r>
-          </a:p>
-          <a:p>
-            <a:pPr lvl="1"/>
-            <a:r>
-              <a:rPr lang="en-US" dirty="0" smtClean="0"/>
-              <a:t>Team: 3 developers</a:t>
-            </a:r>
-          </a:p>
-          <a:p>
-            <a:pPr lvl="1"/>
-            <a:r>
-              <a:rPr lang="en-US" dirty="0" smtClean="0"/>
-              <a:t>Application: Shipping tariff calculation system</a:t>
-            </a:r>
-          </a:p>
-          <a:p>
-            <a:pPr lvl="1"/>
-            <a:r>
-              <a:rPr lang="en-US" dirty="0" smtClean="0"/>
-              <a:t>Time: 3 months</a:t>
-            </a:r>
-            <a:endParaRPr lang="en-US" dirty="0"/>
-          </a:p>
-        </p:txBody>
-      </p:sp>
-    </p:spTree>
-    <p:extLst>
-      <p:ext uri="{BB962C8B-B14F-4D97-AF65-F5344CB8AC3E}">
-        <p14:creationId xmlns:p14="http://schemas.microsoft.com/office/powerpoint/2010/main" val="846874881"/>
-      </p:ext>
-    </p:extLst>
-  </p:cSld>
-  <p:clrMapOvr>
-    <a:masterClrMapping/>
-  </p:clrMapOvr>
-</p:sld>
-</file>
-
-<file path=ppt/slides/slide19.xml><?xml version="1.0" encoding="utf-8"?>
-<p:sld xmlns:a="http://schemas.openxmlformats.org/drawingml/2006/main" xmlns:r="http://schemas.openxmlformats.org/officeDocument/2006/relationships" xmlns:p="http://schemas.openxmlformats.org/presentationml/2006/main">
-  <p:cSld>
-    <p:spTree>
-      <p:nvGrpSpPr>
-        <p:cNvPr id="1" name=""/>
-        <p:cNvGrpSpPr/>
-        <p:nvPr/>
-      </p:nvGrpSpPr>
-      <p:grpSpPr>
-        <a:xfrm>
-          <a:off x="0" y="0"/>
-          <a:ext cx="0" cy="0"/>
-          <a:chOff x="0" y="0"/>
-          <a:chExt cx="0" cy="0"/>
-        </a:xfrm>
-      </p:grpSpPr>
-      <p:sp>
-        <p:nvSpPr>
-          <p:cNvPr id="2" name="Title 1"/>
-          <p:cNvSpPr>
-            <a:spLocks noGrp="1"/>
-          </p:cNvSpPr>
-          <p:nvPr>
-            <p:ph type="title"/>
-          </p:nvPr>
-        </p:nvSpPr>
-        <p:spPr/>
-        <p:txBody>
-          <a:bodyPr/>
-          <a:lstStyle/>
-          <a:p>
-            <a:r>
               <a:rPr lang="en-US" dirty="0" smtClean="0"/>
               <a:t>Questions?/Comments</a:t>
             </a:r>
@@ -6908,6 +8265,10 @@
           <a:bodyPr/>
           <a:lstStyle/>
           <a:p>
+            <a:r>
+              <a:rPr lang="en-US" dirty="0" smtClean="0"/>
+              <a:t>Extreme Programming (XP)</a:t>
+            </a:r>
             <a:endParaRPr lang="en-US" dirty="0"/>
           </a:p>
         </p:txBody>
@@ -6922,86 +8283,67 @@
             <p:ph idx="1"/>
           </p:nvPr>
         </p:nvSpPr>
-        <p:spPr/>
-        <p:txBody>
-          <a:bodyPr/>
-          <a:lstStyle/>
-          <a:p>
-            <a:endParaRPr lang="en-US" dirty="0"/>
-          </a:p>
-        </p:txBody>
-      </p:sp>
-    </p:spTree>
-    <p:extLst>
-      <p:ext uri="{BB962C8B-B14F-4D97-AF65-F5344CB8AC3E}">
-        <p14:creationId xmlns:p14="http://schemas.microsoft.com/office/powerpoint/2010/main" val="2161858943"/>
-      </p:ext>
-    </p:extLst>
-  </p:cSld>
-  <p:clrMapOvr>
-    <a:masterClrMapping/>
-  </p:clrMapOvr>
-</p:sld>
-</file>
-
-<file path=ppt/slides/slide20.xml><?xml version="1.0" encoding="utf-8"?>
-<p:sld xmlns:a="http://schemas.openxmlformats.org/drawingml/2006/main" xmlns:r="http://schemas.openxmlformats.org/officeDocument/2006/relationships" xmlns:p="http://schemas.openxmlformats.org/presentationml/2006/main">
-  <p:cSld>
-    <p:spTree>
-      <p:nvGrpSpPr>
-        <p:cNvPr id="1" name=""/>
-        <p:cNvGrpSpPr/>
-        <p:nvPr/>
-      </p:nvGrpSpPr>
-      <p:grpSpPr>
-        <a:xfrm>
-          <a:off x="0" y="0"/>
-          <a:ext cx="0" cy="0"/>
-          <a:chOff x="0" y="0"/>
-          <a:chExt cx="0" cy="0"/>
-        </a:xfrm>
-      </p:grpSpPr>
-      <p:sp>
-        <p:nvSpPr>
-          <p:cNvPr id="2" name="Title 1"/>
-          <p:cNvSpPr>
-            <a:spLocks noGrp="1"/>
-          </p:cNvSpPr>
-          <p:nvPr>
-            <p:ph type="title"/>
-          </p:nvPr>
-        </p:nvSpPr>
-        <p:spPr/>
-        <p:txBody>
-          <a:bodyPr/>
-          <a:lstStyle/>
-          <a:p>
-            <a:r>
-              <a:rPr lang="en-US" dirty="0" smtClean="0">
-                <a:solidFill>
-                  <a:srgbClr val="FF0000"/>
-                </a:solidFill>
-              </a:rPr>
-              <a:t>EXTRA</a:t>
-            </a:r>
-            <a:endParaRPr lang="en-US" dirty="0">
-              <a:solidFill>
-                <a:srgbClr val="FF0000"/>
-              </a:solidFill>
-            </a:endParaRPr>
+        <p:spPr>
+          <a:xfrm>
+            <a:off x="1463040" y="2119257"/>
+            <a:ext cx="6196405" cy="1843143"/>
+          </a:xfrm>
+        </p:spPr>
+        <p:txBody>
+          <a:bodyPr>
+            <a:normAutofit fontScale="70000" lnSpcReduction="20000"/>
+          </a:bodyPr>
+          <a:lstStyle/>
+          <a:p>
+            <a:r>
+              <a:rPr lang="en-US" dirty="0" smtClean="0"/>
+              <a:t>Waterfall </a:t>
+            </a:r>
+            <a:r>
+              <a:rPr lang="en-US" dirty="0"/>
+              <a:t>Model has long development </a:t>
+            </a:r>
+            <a:r>
+              <a:rPr lang="en-US" dirty="0" smtClean="0"/>
+              <a:t>cycles</a:t>
+            </a:r>
+          </a:p>
+          <a:p>
+            <a:r>
+              <a:rPr lang="en-US" dirty="0" smtClean="0"/>
+              <a:t>Iterative approach (Spiral Model) has shorter development cycles</a:t>
+            </a:r>
+          </a:p>
+          <a:p>
+            <a:r>
+              <a:rPr lang="en-US" dirty="0" smtClean="0"/>
+              <a:t>Extreme Programming (XP) break down into even smaller activities</a:t>
+            </a:r>
+          </a:p>
+          <a:p>
+            <a:pPr lvl="1"/>
+            <a:r>
+              <a:rPr lang="en-US" dirty="0"/>
+              <a:t>Rather than planning, analyzing, and designing for the future, do all these tasks in small amounts throughout software </a:t>
+            </a:r>
+            <a:r>
+              <a:rPr lang="en-US" dirty="0" smtClean="0"/>
+              <a:t>development</a:t>
+            </a:r>
+            <a:endParaRPr lang="en-US" dirty="0"/>
           </a:p>
         </p:txBody>
       </p:sp>
       <p:pic>
         <p:nvPicPr>
-          <p:cNvPr id="3" name="Picture 2"/>
+          <p:cNvPr id="4" name="Picture 3"/>
           <p:cNvPicPr>
             <a:picLocks noChangeAspect="1"/>
           </p:cNvPicPr>
           <p:nvPr/>
         </p:nvPicPr>
         <p:blipFill>
-          <a:blip r:embed="rId2">
+          <a:blip r:embed="rId3">
             <a:extLst>
               <a:ext uri="{28A0092B-C50C-407E-A947-70E740481C1C}">
                 <a14:useLocalDpi xmlns:a14="http://schemas.microsoft.com/office/drawing/2010/main" val="0"/>
@@ -7014,8 +8356,8 @@
         </p:blipFill>
         <p:spPr>
           <a:xfrm>
-            <a:off x="1618837" y="2052445"/>
-            <a:ext cx="5906325" cy="2753109"/>
+            <a:off x="1258645" y="3810000"/>
+            <a:ext cx="6400800" cy="2263077"/>
           </a:xfrm>
           <a:prstGeom prst="rect">
             <a:avLst/>
@@ -7025,7 +8367,7 @@
     </p:spTree>
     <p:extLst>
       <p:ext uri="{BB962C8B-B14F-4D97-AF65-F5344CB8AC3E}">
-        <p14:creationId xmlns:p14="http://schemas.microsoft.com/office/powerpoint/2010/main" val="588869763"/>
+        <p14:creationId xmlns:p14="http://schemas.microsoft.com/office/powerpoint/2010/main" val="2161858943"/>
       </p:ext>
     </p:extLst>
   </p:cSld>
@@ -7069,46 +8411,128 @@
           <a:p>
             <a:r>
               <a:rPr lang="en-US" dirty="0" smtClean="0"/>
-              <a:t>Evolution of XP</a:t>
-            </a:r>
-            <a:endParaRPr lang="en-US" dirty="0"/>
-          </a:p>
-        </p:txBody>
-      </p:sp>
-      <p:pic>
-        <p:nvPicPr>
-          <p:cNvPr id="3" name="Picture 2"/>
-          <p:cNvPicPr>
-            <a:picLocks noChangeAspect="1"/>
-          </p:cNvPicPr>
-          <p:nvPr/>
-        </p:nvPicPr>
-        <p:blipFill>
-          <a:blip r:embed="rId2">
-            <a:extLst>
-              <a:ext uri="{28A0092B-C50C-407E-A947-70E740481C1C}">
-                <a14:useLocalDpi xmlns:a14="http://schemas.microsoft.com/office/drawing/2010/main" val="0"/>
-              </a:ext>
-            </a:extLst>
-          </a:blip>
-          <a:stretch>
-            <a:fillRect/>
-          </a:stretch>
-        </p:blipFill>
-        <p:spPr>
-          <a:xfrm>
-            <a:off x="961521" y="2152472"/>
-            <a:ext cx="7220958" cy="2553056"/>
-          </a:xfrm>
-          <a:prstGeom prst="rect">
-            <a:avLst/>
-          </a:prstGeom>
-        </p:spPr>
-      </p:pic>
+              <a:t>History/Roots of XP</a:t>
+            </a:r>
+            <a:endParaRPr lang="en-US" dirty="0"/>
+          </a:p>
+        </p:txBody>
+      </p:sp>
+      <p:sp>
+        <p:nvSpPr>
+          <p:cNvPr id="3" name="Content Placeholder 2"/>
+          <p:cNvSpPr>
+            <a:spLocks noGrp="1"/>
+          </p:cNvSpPr>
+          <p:nvPr>
+            <p:ph idx="1"/>
+          </p:nvPr>
+        </p:nvSpPr>
+        <p:spPr/>
+        <p:txBody>
+          <a:bodyPr>
+            <a:normAutofit fontScale="62500" lnSpcReduction="20000"/>
+          </a:bodyPr>
+          <a:lstStyle/>
+          <a:p>
+            <a:r>
+              <a:rPr lang="en-US" b="1" dirty="0" smtClean="0"/>
+              <a:t>Strict split between business and technical decision making:</a:t>
+            </a:r>
+            <a:r>
+              <a:rPr lang="en-US" dirty="0" smtClean="0"/>
+              <a:t> Architect Christopher Alexander – </a:t>
+            </a:r>
+            <a:r>
+              <a:rPr lang="en-US" i="1" dirty="0" smtClean="0"/>
+              <a:t>The Timeless Way of Building</a:t>
+            </a:r>
+            <a:endParaRPr lang="en-US" dirty="0" smtClean="0"/>
+          </a:p>
+          <a:p>
+            <a:r>
+              <a:rPr lang="en-US" b="1" dirty="0" smtClean="0"/>
+              <a:t>Rapid evolution of a plan:</a:t>
+            </a:r>
+            <a:r>
+              <a:rPr lang="en-US" dirty="0" smtClean="0"/>
+              <a:t> Scrum methodology and Ward Cunningham’s Episodes pattern language</a:t>
+            </a:r>
+          </a:p>
+          <a:p>
+            <a:r>
+              <a:rPr lang="en-US" b="1" dirty="0" smtClean="0"/>
+              <a:t>Emphasis on specifying and scheduling projects by feature: </a:t>
+            </a:r>
+            <a:r>
+              <a:rPr lang="en-US" dirty="0" smtClean="0"/>
+              <a:t>Ivar Jacobson’s work on use cases</a:t>
+            </a:r>
+          </a:p>
+          <a:p>
+            <a:r>
+              <a:rPr lang="en-US" b="1" dirty="0" smtClean="0"/>
+              <a:t>Evolutionary delivery: </a:t>
+            </a:r>
+            <a:r>
+              <a:rPr lang="en-US" dirty="0" smtClean="0"/>
+              <a:t>Tom Gilb’s writings on EVO, getting software into production in weeks and then worry about growth</a:t>
+            </a:r>
+          </a:p>
+          <a:p>
+            <a:r>
+              <a:rPr lang="en-US" b="1" dirty="0" smtClean="0"/>
+              <a:t>Initial break from waterfall: </a:t>
+            </a:r>
+            <a:r>
+              <a:rPr lang="en-US" dirty="0" smtClean="0"/>
+              <a:t>Barry Boehm’s Spiral Model</a:t>
+            </a:r>
+          </a:p>
+          <a:p>
+            <a:r>
+              <a:rPr lang="en-US" b="1" dirty="0" smtClean="0"/>
+              <a:t>Exploiting powerful technology with JIT method: </a:t>
+            </a:r>
+            <a:r>
+              <a:rPr lang="en-US" dirty="0" smtClean="0"/>
+              <a:t>Dave Thomas and colleagues at Object Technology International</a:t>
+            </a:r>
+          </a:p>
+          <a:p>
+            <a:r>
+              <a:rPr lang="en-US" b="1" dirty="0" smtClean="0"/>
+              <a:t>Use of metaphors: </a:t>
+            </a:r>
+            <a:r>
+              <a:rPr lang="en-US" dirty="0" smtClean="0"/>
+              <a:t>George Lakoff and Mark Johnson’s books (</a:t>
+            </a:r>
+            <a:r>
+              <a:rPr lang="en-US" i="1" dirty="0" smtClean="0"/>
+              <a:t>Philosophy in the Flesh</a:t>
+            </a:r>
+            <a:r>
+              <a:rPr lang="en-US" dirty="0" smtClean="0"/>
+              <a:t>) and Richard Coyne who links metaphor with software development in a postmodern philosophy</a:t>
+            </a:r>
+          </a:p>
+          <a:p>
+            <a:r>
+              <a:rPr lang="en-US" b="1" dirty="0" smtClean="0"/>
+              <a:t>Office space: </a:t>
+            </a:r>
+            <a:r>
+              <a:rPr lang="en-US" dirty="0" smtClean="0"/>
+              <a:t>Jim Coplien, Tom DeMarco, and Jim Lister’s ideas on the importance of physical environment for programmers</a:t>
+            </a:r>
+            <a:endParaRPr lang="en-US" dirty="0"/>
+          </a:p>
+        </p:txBody>
+      </p:sp>
     </p:spTree>
     <p:extLst>
       <p:ext uri="{BB962C8B-B14F-4D97-AF65-F5344CB8AC3E}">
-        <p14:creationId xmlns:p14="http://schemas.microsoft.com/office/powerpoint/2010/main" val="751633624"/>
+        <p14:creationId xmlns:p14="http://schemas.microsoft.com/office/powerpoint/2010/main" val="431566502"/>
       </p:ext>
     </p:extLst>
   </p:cSld>
@@ -7152,7 +8576,7 @@
           <a:p>
             <a:r>
               <a:rPr lang="en-US" dirty="0" smtClean="0"/>
-              <a:t>History/Roots of XP</a:t>
+              <a:t>XP Practices (1 of 3)</a:t>
             </a:r>
             <a:endParaRPr lang="en-US" dirty="0"/>
           </a:p>
@@ -7176,148 +8600,97 @@
           <a:lstStyle/>
           <a:p>
             <a:r>
-              <a:rPr lang="en-US" b="1" dirty="0" smtClean="0"/>
-              <a:t>Strict split between business and technical decision making:</a:t>
-            </a:r>
-            <a:r>
-              <a:rPr lang="en-US" dirty="0" smtClean="0"/>
-              <a:t> Architect Christopher Alexander – </a:t>
-            </a:r>
-            <a:r>
-              <a:rPr lang="en-US" i="1" dirty="0" smtClean="0"/>
-              <a:t>The Timeless Way of Building</a:t>
-            </a:r>
-            <a:endParaRPr lang="en-US" dirty="0" smtClean="0"/>
-          </a:p>
-          <a:p>
-            <a:r>
-              <a:rPr lang="en-US" b="1" dirty="0" smtClean="0"/>
-              <a:t>Rapid evolution of a plan:</a:t>
-            </a:r>
-            <a:r>
-              <a:rPr lang="en-US" dirty="0" smtClean="0"/>
-              <a:t> Scrum methodology and Ward Cunningham’s Episodes pattern language</a:t>
-            </a:r>
-          </a:p>
-          <a:p>
-            <a:r>
-              <a:rPr lang="en-US" b="1" dirty="0" smtClean="0"/>
-              <a:t>Emphasis on specifying and scheduling projects by feature: </a:t>
-            </a:r>
-            <a:r>
-              <a:rPr lang="en-US" dirty="0" err="1" smtClean="0"/>
-              <a:t>Ivar</a:t>
-            </a:r>
-            <a:r>
-              <a:rPr lang="en-US" dirty="0" smtClean="0"/>
-              <a:t> Jacobson’s work on use cases</a:t>
-            </a:r>
-          </a:p>
-          <a:p>
-            <a:r>
-              <a:rPr lang="en-US" b="1" dirty="0" smtClean="0"/>
-              <a:t>Evolutionary delivery: </a:t>
-            </a:r>
-            <a:r>
-              <a:rPr lang="en-US" dirty="0" smtClean="0"/>
-              <a:t>Tom </a:t>
-            </a:r>
-            <a:r>
-              <a:rPr lang="en-US" dirty="0" err="1" smtClean="0"/>
-              <a:t>Gilb’s</a:t>
-            </a:r>
-            <a:r>
-              <a:rPr lang="en-US" dirty="0" smtClean="0"/>
-              <a:t> writings on </a:t>
-            </a:r>
-            <a:r>
-              <a:rPr lang="en-US" dirty="0" err="1" smtClean="0"/>
-              <a:t>EVO</a:t>
-            </a:r>
-            <a:r>
-              <a:rPr lang="en-US" dirty="0" smtClean="0"/>
-              <a:t>, getting software into production in weeks and then worry about growth</a:t>
-            </a:r>
-          </a:p>
-          <a:p>
-            <a:r>
-              <a:rPr lang="en-US" b="1" dirty="0" smtClean="0"/>
-              <a:t>Initial break from waterfall: </a:t>
-            </a:r>
-            <a:r>
-              <a:rPr lang="en-US" dirty="0" smtClean="0"/>
-              <a:t>Barry Boehm’s Spiral Model</a:t>
-            </a:r>
-          </a:p>
-          <a:p>
-            <a:r>
-              <a:rPr lang="en-US" b="1" dirty="0" smtClean="0"/>
-              <a:t>Exploiting powerful technology with </a:t>
-            </a:r>
-            <a:r>
-              <a:rPr lang="en-US" b="1" dirty="0" err="1" smtClean="0"/>
-              <a:t>JIT</a:t>
-            </a:r>
-            <a:r>
-              <a:rPr lang="en-US" b="1" dirty="0" smtClean="0"/>
-              <a:t> method: </a:t>
-            </a:r>
-            <a:r>
-              <a:rPr lang="en-US" dirty="0" smtClean="0"/>
-              <a:t>Dave Thomas and colleagues at Object Technology International</a:t>
-            </a:r>
-          </a:p>
-          <a:p>
-            <a:r>
-              <a:rPr lang="en-US" b="1" dirty="0" smtClean="0"/>
-              <a:t>Use of metaphors: </a:t>
-            </a:r>
-            <a:r>
-              <a:rPr lang="en-US" dirty="0" smtClean="0"/>
-              <a:t>George </a:t>
-            </a:r>
-            <a:r>
-              <a:rPr lang="en-US" dirty="0" err="1" smtClean="0"/>
-              <a:t>Lakoff</a:t>
-            </a:r>
-            <a:r>
-              <a:rPr lang="en-US" dirty="0" smtClean="0"/>
-              <a:t> and Mark Johnson’s books (</a:t>
-            </a:r>
-            <a:r>
-              <a:rPr lang="en-US" i="1" dirty="0" smtClean="0"/>
-              <a:t>Philosophy in the Flesh</a:t>
-            </a:r>
-            <a:r>
-              <a:rPr lang="en-US" dirty="0" smtClean="0"/>
-              <a:t>) and Richard Coyne who links metaphor with software development in a postmodern philosophy</a:t>
-            </a:r>
-          </a:p>
-          <a:p>
-            <a:r>
-              <a:rPr lang="en-US" b="1" dirty="0" smtClean="0"/>
-              <a:t>Office space: </a:t>
-            </a:r>
-            <a:r>
-              <a:rPr lang="en-US" dirty="0" smtClean="0"/>
-              <a:t>Jim </a:t>
-            </a:r>
-            <a:r>
-              <a:rPr lang="en-US" dirty="0" err="1" smtClean="0"/>
-              <a:t>Coplien</a:t>
-            </a:r>
-            <a:r>
-              <a:rPr lang="en-US" dirty="0" smtClean="0"/>
-              <a:t>, Tom DeMarco, and Jim Lister’s ideas on the importance of physical environment for programmers</a:t>
-            </a:r>
-            <a:endParaRPr lang="en-US" dirty="0"/>
+              <a:rPr lang="en-US" dirty="0" smtClean="0"/>
+              <a:t>Planning game</a:t>
+            </a:r>
+          </a:p>
+          <a:p>
+            <a:pPr lvl="1"/>
+            <a:r>
+              <a:rPr lang="en-US" dirty="0" smtClean="0"/>
+              <a:t>Customers decide on scope and timing of releases based on programmers estimates</a:t>
+            </a:r>
+          </a:p>
+          <a:p>
+            <a:pPr lvl="1"/>
+            <a:r>
+              <a:rPr lang="en-US" dirty="0" smtClean="0"/>
+              <a:t>Programmers only implement the functionality necessary for the stories in this iteration</a:t>
+            </a:r>
+          </a:p>
+          <a:p>
+            <a:r>
+              <a:rPr lang="en-US" dirty="0" smtClean="0"/>
+              <a:t>Small releases</a:t>
+            </a:r>
+          </a:p>
+          <a:p>
+            <a:pPr lvl="1"/>
+            <a:r>
+              <a:rPr lang="en-US" dirty="0" smtClean="0"/>
+              <a:t>System is put into production before the whole problem is solved (a few months)</a:t>
+            </a:r>
+          </a:p>
+          <a:p>
+            <a:pPr lvl="1"/>
+            <a:r>
+              <a:rPr lang="en-US" dirty="0" smtClean="0"/>
+              <a:t>New releases are made often (daily to monthly)</a:t>
+            </a:r>
+          </a:p>
+          <a:p>
+            <a:r>
+              <a:rPr lang="en-US" dirty="0" smtClean="0"/>
+              <a:t>Metaphor</a:t>
+            </a:r>
+          </a:p>
+          <a:p>
+            <a:pPr lvl="1"/>
+            <a:r>
+              <a:rPr lang="en-US" dirty="0" smtClean="0"/>
+              <a:t>Shape of the system shared between the customer and programmers</a:t>
+            </a:r>
+          </a:p>
+          <a:p>
+            <a:r>
+              <a:rPr lang="en-US" dirty="0" smtClean="0"/>
+              <a:t>Simple design</a:t>
+            </a:r>
+          </a:p>
+          <a:p>
+            <a:pPr lvl="1"/>
+            <a:r>
+              <a:rPr lang="en-US" dirty="0" smtClean="0"/>
+              <a:t>At any moment:</a:t>
+            </a:r>
+          </a:p>
+          <a:p>
+            <a:pPr lvl="2"/>
+            <a:r>
+              <a:rPr lang="en-US" dirty="0" smtClean="0"/>
+              <a:t>All tests can/are run</a:t>
+            </a:r>
+          </a:p>
+          <a:p>
+            <a:pPr lvl="2"/>
+            <a:r>
+              <a:rPr lang="en-US" dirty="0" smtClean="0"/>
+              <a:t>No duplicate code</a:t>
+            </a:r>
+          </a:p>
+          <a:p>
+            <a:pPr lvl="2"/>
+            <a:r>
+              <a:rPr lang="en-US" dirty="0" smtClean="0"/>
+              <a:t>Fewest possible classes and methods</a:t>
+            </a:r>
           </a:p>
         </p:txBody>
       </p:sp>
     </p:spTree>
     <p:extLst>
       <p:ext uri="{BB962C8B-B14F-4D97-AF65-F5344CB8AC3E}">
-        <p14:creationId xmlns:p14="http://schemas.microsoft.com/office/powerpoint/2010/main" val="431566502"/>
+        <p14:creationId xmlns:p14="http://schemas.microsoft.com/office/powerpoint/2010/main" val="3469914193"/>
       </p:ext>
     </p:extLst>
   </p:cSld>
@@ -7361,7 +8734,7 @@
           <a:p>
             <a:r>
               <a:rPr lang="en-US" dirty="0" smtClean="0"/>
-              <a:t>XP Practices (1 of 3)</a:t>
+              <a:t>XP Practices (2 of 3)</a:t>
             </a:r>
             <a:endParaRPr lang="en-US" dirty="0"/>
           </a:p>
@@ -7380,101 +8753,100 @@
         <p:spPr/>
         <p:txBody>
           <a:bodyPr>
-            <a:normAutofit fontScale="62500" lnSpcReduction="20000"/>
+            <a:normAutofit fontScale="70000" lnSpcReduction="20000"/>
           </a:bodyPr>
           <a:lstStyle/>
           <a:p>
             <a:r>
               <a:rPr lang="en-US" dirty="0" smtClean="0"/>
-              <a:t>Planning game</a:t>
+              <a:t>Tests</a:t>
             </a:r>
           </a:p>
           <a:p>
             <a:pPr lvl="1"/>
             <a:r>
               <a:rPr lang="en-US" dirty="0" smtClean="0"/>
-              <a:t>Customers decide on scope and timing of releases based on programmers estimates</a:t>
+              <a:t>Unit tests are written by programmers minute by minute</a:t>
             </a:r>
           </a:p>
           <a:p>
             <a:pPr lvl="1"/>
             <a:r>
               <a:rPr lang="en-US" dirty="0" smtClean="0"/>
-              <a:t>Programmers only implement the functionality necessary for the stories in this iteration</a:t>
-            </a:r>
-          </a:p>
-          <a:p>
-            <a:r>
-              <a:rPr lang="en-US" dirty="0" smtClean="0"/>
-              <a:t>Small releases</a:t>
+              <a:t>Customer write functional tests for iteration stories</a:t>
             </a:r>
           </a:p>
           <a:p>
             <a:pPr lvl="1"/>
             <a:r>
-              <a:rPr lang="en-US" dirty="0" smtClean="0"/>
-              <a:t>System is put into production before the whole problem is solved (a few months)</a:t>
+              <a:rPr lang="en-US" dirty="0"/>
+              <a:t>All tests are run </a:t>
+            </a:r>
+            <a:r>
+              <a:rPr lang="en-US" dirty="0" smtClean="0"/>
+              <a:t>collectively</a:t>
             </a:r>
           </a:p>
           <a:p>
             <a:pPr lvl="1"/>
             <a:r>
               <a:rPr lang="en-US" dirty="0" smtClean="0"/>
-              <a:t>New releases are made often (daily to monthly)</a:t>
-            </a:r>
-          </a:p>
-          <a:p>
-            <a:r>
-              <a:rPr lang="en-US" dirty="0" smtClean="0"/>
-              <a:t>Metaphor</a:t>
+              <a:t>Must </a:t>
+            </a:r>
+            <a:r>
+              <a:rPr lang="en-US" dirty="0"/>
+              <a:t>run </a:t>
+            </a:r>
+            <a:r>
+              <a:rPr lang="en-US" dirty="0" smtClean="0"/>
+              <a:t>correctly Refactoring</a:t>
             </a:r>
           </a:p>
           <a:p>
             <a:pPr lvl="1"/>
             <a:r>
               <a:rPr lang="en-US" dirty="0" smtClean="0"/>
-              <a:t>Shape of the system shared between the customer and programmers</a:t>
-            </a:r>
-          </a:p>
-          <a:p>
-            <a:r>
-              <a:rPr lang="en-US" dirty="0" smtClean="0"/>
-              <a:t>Simple design</a:t>
+              <a:t>System design is evolving as existing design is transformed</a:t>
             </a:r>
           </a:p>
           <a:p>
             <a:pPr lvl="1"/>
             <a:r>
               <a:rPr lang="en-US" dirty="0" smtClean="0"/>
-              <a:t>At any moment:</a:t>
-            </a:r>
-          </a:p>
-          <a:p>
-            <a:pPr lvl="2"/>
-            <a:r>
-              <a:rPr lang="en-US" dirty="0" smtClean="0"/>
-              <a:t>All tests can/are run</a:t>
-            </a:r>
-          </a:p>
-          <a:p>
-            <a:pPr lvl="2"/>
-            <a:r>
-              <a:rPr lang="en-US" dirty="0" smtClean="0"/>
-              <a:t>No duplicate code</a:t>
-            </a:r>
-          </a:p>
-          <a:p>
-            <a:pPr lvl="2"/>
-            <a:r>
-              <a:rPr lang="en-US" dirty="0" smtClean="0"/>
-              <a:t>Fewest possible classes and methods</a:t>
-            </a:r>
-          </a:p>
-          <a:p>
-            <a:pPr lvl="2"/>
-            <a:r>
-              <a:rPr lang="en-US" dirty="0" smtClean="0"/>
-              <a:t>“Say everything once and only once”</a:t>
+              <a:t>Keep all tests running (stipulation for practicality)</a:t>
+            </a:r>
+          </a:p>
+          <a:p>
+            <a:r>
+              <a:rPr lang="en-US" dirty="0" smtClean="0"/>
+              <a:t>Pair programming</a:t>
+            </a:r>
+          </a:p>
+          <a:p>
+            <a:pPr lvl="1"/>
+            <a:r>
+              <a:rPr lang="en-US" dirty="0" smtClean="0"/>
+              <a:t>All production code is written by two people at one workstation (screen/keyboard/mouse)</a:t>
+            </a:r>
+          </a:p>
+          <a:p>
+            <a:r>
+              <a:rPr lang="en-US" dirty="0" smtClean="0"/>
+              <a:t>Continuous Integration</a:t>
+            </a:r>
+          </a:p>
+          <a:p>
+            <a:pPr lvl="1"/>
+            <a:r>
+              <a:rPr lang="en-US" dirty="0" smtClean="0"/>
+              <a:t>New code is integrated with current system within a few hours</a:t>
+            </a:r>
+          </a:p>
+          <a:p>
+            <a:pPr lvl="1"/>
+            <a:r>
+              <a:rPr lang="en-US" dirty="0" smtClean="0"/>
+              <a:t>System is built from scratch and all tests must pass</a:t>
             </a:r>
           </a:p>
         </p:txBody>
@@ -7482,7 +8854,7 @@
     </p:spTree>
     <p:extLst>
       <p:ext uri="{BB962C8B-B14F-4D97-AF65-F5344CB8AC3E}">
-        <p14:creationId xmlns:p14="http://schemas.microsoft.com/office/powerpoint/2010/main" val="3469914193"/>
+        <p14:creationId xmlns:p14="http://schemas.microsoft.com/office/powerpoint/2010/main" val="1541191764"/>
       </p:ext>
     </p:extLst>
   </p:cSld>
@@ -7526,7 +8898,7 @@
           <a:p>
             <a:r>
               <a:rPr lang="en-US" dirty="0" smtClean="0"/>
-              <a:t>XP Practices (2 of 3)</a:t>
+              <a:t>XP Practices (3 of 3)</a:t>
             </a:r>
             <a:endParaRPr lang="en-US" dirty="0"/>
           </a:p>
@@ -7551,102 +8923,96 @@
           <a:p>
             <a:r>
               <a:rPr lang="en-US" dirty="0" smtClean="0"/>
-              <a:t>Tests</a:t>
+              <a:t>Collective ownership</a:t>
             </a:r>
           </a:p>
           <a:p>
             <a:pPr lvl="1"/>
             <a:r>
               <a:rPr lang="en-US" dirty="0" smtClean="0"/>
-              <a:t>Unit tests are written by programmers minute by minute</a:t>
+              <a:t>Every programmer can/does improve any code in the system at any time</a:t>
+            </a:r>
+          </a:p>
+          <a:p>
+            <a:r>
+              <a:rPr lang="en-US" dirty="0" smtClean="0"/>
+              <a:t>On-site customer</a:t>
             </a:r>
           </a:p>
           <a:p>
             <a:pPr lvl="1"/>
             <a:r>
               <a:rPr lang="en-US" dirty="0" smtClean="0"/>
-              <a:t>Customer write functional tests for iteration stories</a:t>
+              <a:t>Customer sits with the team full-time</a:t>
+            </a:r>
+          </a:p>
+          <a:p>
+            <a:r>
+              <a:rPr lang="en-US" dirty="0" smtClean="0"/>
+              <a:t>40-hour weeks</a:t>
             </a:r>
           </a:p>
           <a:p>
             <a:pPr lvl="1"/>
             <a:r>
-              <a:rPr lang="en-US" dirty="0"/>
-              <a:t>All tests are run </a:t>
-            </a:r>
-            <a:r>
-              <a:rPr lang="en-US" dirty="0" smtClean="0"/>
-              <a:t>collectively</a:t>
+              <a:rPr lang="en-US" dirty="0" smtClean="0"/>
+              <a:t>Isolated overtime use</a:t>
             </a:r>
           </a:p>
           <a:p>
             <a:pPr lvl="1"/>
             <a:r>
               <a:rPr lang="en-US" dirty="0" smtClean="0"/>
-              <a:t>Must </a:t>
-            </a:r>
-            <a:r>
-              <a:rPr lang="en-US" dirty="0"/>
-              <a:t>run </a:t>
-            </a:r>
-            <a:r>
-              <a:rPr lang="en-US" dirty="0" smtClean="0"/>
-              <a:t>correctly Refactoring</a:t>
+              <a:t>No working a two weeks of overtime in a row</a:t>
+            </a:r>
+          </a:p>
+          <a:p>
+            <a:r>
+              <a:rPr lang="en-US" dirty="0" smtClean="0"/>
+              <a:t>Open workspace</a:t>
             </a:r>
           </a:p>
           <a:p>
             <a:pPr lvl="1"/>
             <a:r>
               <a:rPr lang="en-US" dirty="0" smtClean="0"/>
-              <a:t>System design is evolving as existing design is transformed</a:t>
+              <a:t>Large room with small cubicles around the outside</a:t>
             </a:r>
           </a:p>
           <a:p>
             <a:pPr lvl="1"/>
             <a:r>
               <a:rPr lang="en-US" dirty="0" smtClean="0"/>
-              <a:t>Keep all tests running (stipulation for practicality)</a:t>
-            </a:r>
-          </a:p>
-          <a:p>
-            <a:r>
-              <a:rPr lang="en-US" dirty="0" smtClean="0"/>
-              <a:t>Pair programming</a:t>
+              <a:t>Pair programming computers in the center</a:t>
+            </a:r>
+          </a:p>
+          <a:p>
+            <a:r>
+              <a:rPr lang="en-US" dirty="0" smtClean="0"/>
+              <a:t>Just rules</a:t>
             </a:r>
           </a:p>
           <a:p>
             <a:pPr lvl="1"/>
             <a:r>
               <a:rPr lang="en-US" dirty="0" smtClean="0"/>
-              <a:t>All production code is written by two people at one workstation (screen/keyboard/mouse)</a:t>
-            </a:r>
-          </a:p>
-          <a:p>
-            <a:r>
-              <a:rPr lang="en-US" dirty="0" smtClean="0"/>
-              <a:t>Continuous Integration</a:t>
+              <a:t>Following XP means following the rules</a:t>
             </a:r>
           </a:p>
           <a:p>
             <a:pPr lvl="1"/>
             <a:r>
               <a:rPr lang="en-US" dirty="0" smtClean="0"/>
-              <a:t>New code is integrated with current system within a few hours</a:t>
-            </a:r>
-          </a:p>
-          <a:p>
-            <a:pPr lvl="1"/>
-            <a:r>
-              <a:rPr lang="en-US" dirty="0" smtClean="0"/>
-              <a:t>System is built from scratch and all tests must pass</a:t>
-            </a:r>
+              <a:t>Rules change be changed to meet the needs of the team</a:t>
+            </a:r>
+            <a:endParaRPr lang="en-US" dirty="0"/>
           </a:p>
         </p:txBody>
       </p:sp>
     </p:spTree>
     <p:extLst>
       <p:ext uri="{BB962C8B-B14F-4D97-AF65-F5344CB8AC3E}">
-        <p14:creationId xmlns:p14="http://schemas.microsoft.com/office/powerpoint/2010/main" val="1541191764"/>
+        <p14:creationId xmlns:p14="http://schemas.microsoft.com/office/powerpoint/2010/main" val="3980951164"/>
       </p:ext>
     </p:extLst>
   </p:cSld>
@@ -7685,12 +9051,21 @@
         </p:nvSpPr>
         <p:spPr/>
         <p:txBody>
-          <a:bodyPr/>
-          <a:lstStyle/>
-          <a:p>
-            <a:r>
-              <a:rPr lang="en-US" dirty="0" smtClean="0"/>
-              <a:t>XP Practices (3 of 3)</a:t>
+          <a:bodyPr>
+            <a:normAutofit fontScale="90000"/>
+          </a:bodyPr>
+          <a:lstStyle/>
+          <a:p>
+            <a:r>
+              <a:rPr lang="en-US" dirty="0" smtClean="0"/>
+              <a:t>Anatomy of XP –</a:t>
+            </a:r>
+            <a:br>
+              <a:rPr lang="en-US" dirty="0" smtClean="0"/>
+            </a:br>
+            <a:r>
+              <a:rPr lang="en-US" dirty="0" smtClean="0"/>
+              <a:t>XP Development Cycle</a:t>
             </a:r>
             <a:endParaRPr lang="en-US" dirty="0"/>
           </a:p>
@@ -7709,102 +9084,101 @@
         <p:spPr/>
         <p:txBody>
           <a:bodyPr>
-            <a:normAutofit fontScale="70000" lnSpcReduction="20000"/>
+            <a:normAutofit fontScale="77500" lnSpcReduction="20000"/>
           </a:bodyPr>
           <a:lstStyle/>
           <a:p>
             <a:r>
               <a:rPr lang="en-US" dirty="0" smtClean="0"/>
-              <a:t>Collective ownership</a:t>
+              <a:t>Customer determines a </a:t>
+            </a:r>
+            <a:r>
+              <a:rPr lang="en-US" b="1" dirty="0" smtClean="0"/>
+              <a:t>release</a:t>
+            </a:r>
+            <a:r>
+              <a:rPr lang="en-US" dirty="0" smtClean="0"/>
+              <a:t> by choosing the most valuable features of all the remaining stories</a:t>
             </a:r>
           </a:p>
           <a:p>
             <a:pPr lvl="1"/>
             <a:r>
               <a:rPr lang="en-US" dirty="0" smtClean="0"/>
-              <a:t>Every programmer can/does improve any code in the system at any time</a:t>
-            </a:r>
-          </a:p>
-          <a:p>
-            <a:r>
-              <a:rPr lang="en-US" dirty="0" smtClean="0"/>
-              <a:t>On-site customer</a:t>
-            </a:r>
+              <a:t>Looks at cost and speed based on already implemented stories</a:t>
+            </a:r>
+          </a:p>
+          <a:p>
+            <a:r>
+              <a:rPr lang="en-US" dirty="0" smtClean="0"/>
+              <a:t>Customer determines an </a:t>
+            </a:r>
+            <a:r>
+              <a:rPr lang="en-US" b="1" dirty="0" smtClean="0"/>
+              <a:t>iteration</a:t>
+            </a:r>
+            <a:r>
+              <a:rPr lang="en-US" dirty="0" smtClean="0"/>
+              <a:t> by choosing from stories remaining in the </a:t>
+            </a:r>
+            <a:r>
+              <a:rPr lang="en-US" b="1" dirty="0" smtClean="0"/>
+              <a:t>release</a:t>
+            </a:r>
+            <a:endParaRPr lang="en-US" b="1" dirty="0"/>
           </a:p>
           <a:p>
             <a:pPr lvl="1"/>
             <a:r>
               <a:rPr lang="en-US" dirty="0" smtClean="0"/>
-              <a:t>Customer sits with the team full-time</a:t>
-            </a:r>
-          </a:p>
-          <a:p>
-            <a:r>
-              <a:rPr lang="en-US" dirty="0" smtClean="0"/>
-              <a:t>40-hour weeks</a:t>
+              <a:t>Again looking at cost and speed</a:t>
+            </a:r>
+          </a:p>
+          <a:p>
+            <a:r>
+              <a:rPr lang="en-US" dirty="0" smtClean="0"/>
+              <a:t>Programmers break down stories into tasks</a:t>
             </a:r>
           </a:p>
           <a:p>
             <a:pPr lvl="1"/>
             <a:r>
               <a:rPr lang="en-US" dirty="0" smtClean="0"/>
-              <a:t>Isolated overtime use</a:t>
+              <a:t>Accepts responsibility</a:t>
+            </a:r>
+          </a:p>
+          <a:p>
+            <a:r>
+              <a:rPr lang="en-US" dirty="0" smtClean="0"/>
+              <a:t>Programmers turn tasks into a set of test cases</a:t>
             </a:r>
           </a:p>
           <a:p>
             <a:pPr lvl="1"/>
             <a:r>
               <a:rPr lang="en-US" dirty="0" smtClean="0"/>
-              <a:t>No working a two weeks of overtime in a row</a:t>
-            </a:r>
-          </a:p>
-          <a:p>
-            <a:r>
-              <a:rPr lang="en-US" dirty="0" smtClean="0"/>
-              <a:t>Open workspace</a:t>
+              <a:t>Tests will demonstrate the task is complete</a:t>
+            </a:r>
+          </a:p>
+          <a:p>
+            <a:r>
+              <a:rPr lang="en-US" dirty="0" smtClean="0"/>
+              <a:t>Programmers work in pairs to make test cases run</a:t>
             </a:r>
           </a:p>
           <a:p>
             <a:pPr lvl="1"/>
             <a:r>
               <a:rPr lang="en-US" dirty="0" smtClean="0"/>
-              <a:t>Large room with small cubicles around the outside</a:t>
-            </a:r>
-          </a:p>
-          <a:p>
-            <a:pPr lvl="1"/>
-            <a:r>
-              <a:rPr lang="en-US" dirty="0" smtClean="0"/>
-              <a:t>Pair programming computers in the center</a:t>
-            </a:r>
-          </a:p>
-          <a:p>
-            <a:r>
-              <a:rPr lang="en-US" dirty="0" smtClean="0"/>
-              <a:t>Just rules</a:t>
-            </a:r>
-          </a:p>
-          <a:p>
-            <a:pPr lvl="1"/>
-            <a:r>
-              <a:rPr lang="en-US" dirty="0" smtClean="0"/>
-              <a:t>Following XP means following the rules</a:t>
-            </a:r>
-          </a:p>
-          <a:p>
-            <a:pPr lvl="1"/>
-            <a:r>
-              <a:rPr lang="en-US" dirty="0" smtClean="0"/>
-              <a:t>Rules change be changed to meet the needs of the team</a:t>
-            </a:r>
-            <a:endParaRPr lang="en-US" dirty="0"/>
+              <a:t>System is evolved to maintain simplest design</a:t>
+            </a:r>
           </a:p>
         </p:txBody>
       </p:sp>
     </p:spTree>
     <p:extLst>
       <p:ext uri="{BB962C8B-B14F-4D97-AF65-F5344CB8AC3E}">
-        <p14:creationId xmlns:p14="http://schemas.microsoft.com/office/powerpoint/2010/main" val="3980951164"/>
+        <p14:creationId xmlns:p14="http://schemas.microsoft.com/office/powerpoint/2010/main" val="3807365439"/>
       </p:ext>
     </p:extLst>
   </p:cSld>
@@ -7849,27 +9223,19 @@
           <a:lstStyle/>
           <a:p>
             <a:r>
-              <a:rPr lang="en-US" dirty="0" smtClean="0">
-                <a:solidFill>
-                  <a:srgbClr val="FF0000"/>
-                </a:solidFill>
-              </a:rPr>
+              <a:rPr lang="en-US" dirty="0"/>
               <a:t>Anatomy of XP –</a:t>
             </a:r>
             <a:br>
-              <a:rPr lang="en-US" dirty="0" smtClean="0">
-                <a:solidFill>
-                  <a:srgbClr val="FF0000"/>
-                </a:solidFill>
-              </a:rPr>
+              <a:rPr lang="en-US" dirty="0"/>
             </a:br>
             <a:r>
-              <a:rPr lang="en-US" dirty="0" smtClean="0">
-                <a:solidFill>
-                  <a:srgbClr val="FF0000"/>
-                </a:solidFill>
-              </a:rPr>
-              <a:t>XP Development Cycle</a:t>
+              <a:rPr lang="en-US" dirty="0"/>
+              <a:t>XP Development </a:t>
+            </a:r>
+            <a:r>
+              <a:rPr lang="en-US" dirty="0" smtClean="0"/>
+              <a:t>Cycle (cont.)</a:t>
             </a:r>
             <a:endParaRPr lang="en-US" dirty="0">
               <a:solidFill>
@@ -7879,29 +9245,40 @@
           </a:p>
         </p:txBody>
       </p:sp>
-      <p:sp>
-        <p:nvSpPr>
-          <p:cNvPr id="3" name="Content Placeholder 2"/>
-          <p:cNvSpPr>
-            <a:spLocks noGrp="1"/>
-          </p:cNvSpPr>
-          <p:nvPr>
-            <p:ph idx="1"/>
-          </p:nvPr>
-        </p:nvSpPr>
-        <p:spPr/>
-        <p:txBody>
-          <a:bodyPr/>
-          <a:lstStyle/>
-          <a:p>
-            <a:endParaRPr lang="en-US" dirty="0"/>
-          </a:p>
-        </p:txBody>
-      </p:sp>
+      <p:pic>
+        <p:nvPicPr>
+          <p:cNvPr id="3" name="Picture 2"/>
+          <p:cNvPicPr>
+            <a:picLocks noChangeAspect="1"/>
+          </p:cNvPicPr>
+          <p:nvPr/>
+        </p:nvPicPr>
+        <p:blipFill>
+          <a:blip r:embed="rId3">
+            <a:extLst>
+              <a:ext uri="{28A0092B-C50C-407E-A947-70E740481C1C}">
+                <a14:useLocalDpi xmlns:a14="http://schemas.microsoft.com/office/drawing/2010/main" val="0"/>
+              </a:ext>
+            </a:extLst>
+          </a:blip>
+          <a:stretch>
+            <a:fillRect/>
+          </a:stretch>
+        </p:blipFill>
+        <p:spPr>
+          <a:xfrm>
+            <a:off x="1752600" y="2514600"/>
+            <a:ext cx="5906325" cy="2753109"/>
+          </a:xfrm>
+          <a:prstGeom prst="rect">
+            <a:avLst/>
+          </a:prstGeom>
+        </p:spPr>
+      </p:pic>
     </p:spTree>
     <p:extLst>
       <p:ext uri="{BB962C8B-B14F-4D97-AF65-F5344CB8AC3E}">
-        <p14:creationId xmlns:p14="http://schemas.microsoft.com/office/powerpoint/2010/main" val="3807365439"/>
+        <p14:creationId xmlns:p14="http://schemas.microsoft.com/office/powerpoint/2010/main" val="588869763"/>
       </p:ext>
     </p:extLst>
   </p:cSld>
@@ -7946,18 +9323,10 @@
           <a:lstStyle/>
           <a:p>
             <a:r>
-              <a:rPr lang="en-US" dirty="0" smtClean="0">
-                <a:solidFill>
-                  <a:srgbClr val="FF0000"/>
-                </a:solidFill>
-              </a:rPr>
+              <a:rPr lang="en-US" dirty="0" smtClean="0"/>
               <a:t>Anatomy of XP – Stories</a:t>
             </a:r>
-            <a:endParaRPr lang="en-US" dirty="0">
-              <a:solidFill>
-                <a:srgbClr val="FF0000"/>
-              </a:solidFill>
-            </a:endParaRPr>
+            <a:endParaRPr lang="en-US" dirty="0"/>
           </a:p>
         </p:txBody>
       </p:sp>
@@ -7973,10 +9342,82 @@
         </p:nvSpPr>
         <p:spPr/>
         <p:txBody>
-          <a:bodyPr/>
-          <a:lstStyle/>
-          <a:p>
-            <a:endParaRPr lang="en-US" dirty="0"/>
+          <a:bodyPr>
+            <a:normAutofit fontScale="85000" lnSpcReduction="10000"/>
+          </a:bodyPr>
+          <a:lstStyle/>
+          <a:p>
+            <a:r>
+              <a:rPr lang="en-US" dirty="0" smtClean="0"/>
+              <a:t>Overall analysis is put together in terms of stories</a:t>
+            </a:r>
+          </a:p>
+          <a:p>
+            <a:pPr lvl="1"/>
+            <a:r>
+              <a:rPr lang="en-US" dirty="0" smtClean="0"/>
+              <a:t>First decisions should be about what it </a:t>
+            </a:r>
+            <a:r>
+              <a:rPr lang="en-US" i="1" dirty="0" smtClean="0"/>
+              <a:t>could</a:t>
+            </a:r>
+            <a:r>
+              <a:rPr lang="en-US" dirty="0" smtClean="0"/>
+              <a:t> do and what it </a:t>
+            </a:r>
+            <a:r>
+              <a:rPr lang="en-US" i="1" dirty="0" smtClean="0"/>
+              <a:t>should</a:t>
+            </a:r>
+            <a:r>
+              <a:rPr lang="en-US" dirty="0" smtClean="0"/>
+              <a:t> do</a:t>
+            </a:r>
+          </a:p>
+          <a:p>
+            <a:pPr lvl="1"/>
+            <a:r>
+              <a:rPr lang="en-US" dirty="0"/>
+              <a:t>Each story much be business-oriented, testable, and able to be estimated</a:t>
+            </a:r>
+          </a:p>
+          <a:p>
+            <a:pPr lvl="1"/>
+            <a:r>
+              <a:rPr lang="en-US" dirty="0" smtClean="0"/>
+              <a:t>Rule of thumb: A story should contain the amount of a use case that can fit on an index card</a:t>
+            </a:r>
+            <a:endParaRPr lang="en-US" dirty="0"/>
+          </a:p>
+          <a:p>
+            <a:pPr lvl="1"/>
+            <a:r>
+              <a:rPr lang="en-US" dirty="0" smtClean="0"/>
+              <a:t>Complete as quickly as possible</a:t>
+            </a:r>
+          </a:p>
+          <a:p>
+            <a:pPr lvl="2"/>
+            <a:r>
+              <a:rPr lang="en-US" dirty="0" smtClean="0"/>
+              <a:t>Do not worry about exploring all possible issues thoroughly</a:t>
+            </a:r>
+          </a:p>
+          <a:p>
+            <a:pPr lvl="2"/>
+            <a:r>
+              <a:rPr lang="en-US" dirty="0" smtClean="0"/>
+              <a:t>10 person-year project should only take a month to determine the stories</a:t>
+            </a:r>
+          </a:p>
+          <a:p>
+            <a:pPr lvl="2"/>
+            <a:endParaRPr lang="en-US" dirty="0"/>
+          </a:p>
+          <a:p>
+            <a:pPr lvl="2"/>
+            <a:endParaRPr lang="en-US" dirty="0" smtClean="0"/>
           </a:p>
         </p:txBody>
       </p:sp>

</xml_diff>